<commit_message>
Releasing lec 27 videos
</commit_message>
<xml_diff>
--- a/tyler/meena/cs220/s21/materials/lec_27_S21.pptx
+++ b/tyler/meena/cs220/s21/materials/lec_27_S21.pptx
@@ -5,7 +5,7 @@
     <p:sldMasterId id="2147483648" r:id="rId1"/>
   </p:sldMasterIdLst>
   <p:notesMasterIdLst>
-    <p:notesMasterId r:id="rId57"/>
+    <p:notesMasterId r:id="rId59"/>
   </p:notesMasterIdLst>
   <p:sldIdLst>
     <p:sldId id="256" r:id="rId2"/>
@@ -61,8 +61,10 @@
     <p:sldId id="305" r:id="rId52"/>
     <p:sldId id="306" r:id="rId53"/>
     <p:sldId id="307" r:id="rId54"/>
-    <p:sldId id="308" r:id="rId55"/>
-    <p:sldId id="309" r:id="rId56"/>
+    <p:sldId id="324" r:id="rId55"/>
+    <p:sldId id="308" r:id="rId56"/>
+    <p:sldId id="309" r:id="rId57"/>
+    <p:sldId id="326" r:id="rId58"/>
   </p:sldIdLst>
   <p:sldSz cx="13004800" cy="9753600"/>
   <p:notesSz cx="6858000" cy="9144000"/>
@@ -2187,7 +2189,7 @@
           </a:ln>
           <a:extLst>
             <a:ext uri="{C572A759-6A51-4108-AA02-DFA0A04FC94B}">
-              <ma14:wrappingTextBoxFlag xmlns:ma14="http://schemas.microsoft.com/office/mac/drawingml/2011/main" xmlns:a14="http://schemas.microsoft.com/office/drawing/2010/main" xmlns:m="http://schemas.openxmlformats.org/officeDocument/2006/math" xmlns="" val="1"/>
+              <ma14:wrappingTextBoxFlag xmlns="" xmlns:m="http://schemas.openxmlformats.org/officeDocument/2006/math" xmlns:a14="http://schemas.microsoft.com/office/drawing/2010/main" xmlns:ma14="http://schemas.microsoft.com/office/mac/drawingml/2011/main" val="1"/>
             </a:ext>
           </a:extLst>
         </p:spPr>
@@ -2226,7 +2228,7 @@
           </a:ln>
           <a:extLst>
             <a:ext uri="{C572A759-6A51-4108-AA02-DFA0A04FC94B}">
-              <ma14:wrappingTextBoxFlag xmlns:ma14="http://schemas.microsoft.com/office/mac/drawingml/2011/main" xmlns:a14="http://schemas.microsoft.com/office/drawing/2010/main" xmlns:m="http://schemas.openxmlformats.org/officeDocument/2006/math" xmlns="" val="1"/>
+              <ma14:wrappingTextBoxFlag xmlns="" xmlns:m="http://schemas.openxmlformats.org/officeDocument/2006/math" xmlns:a14="http://schemas.microsoft.com/office/drawing/2010/main" xmlns:ma14="http://schemas.microsoft.com/office/mac/drawingml/2011/main" val="1"/>
             </a:ext>
           </a:extLst>
         </p:spPr>
@@ -3331,7 +3333,7 @@
           </a:ln>
           <a:extLst>
             <a:ext uri="{C572A759-6A51-4108-AA02-DFA0A04FC94B}">
-              <ma14:wrappingTextBoxFlag xmlns:ma14="http://schemas.microsoft.com/office/mac/drawingml/2011/main" xmlns:a14="http://schemas.microsoft.com/office/drawing/2010/main" xmlns:m="http://schemas.openxmlformats.org/officeDocument/2006/math" xmlns="" val="1"/>
+              <ma14:wrappingTextBoxFlag xmlns="" xmlns:m="http://schemas.openxmlformats.org/officeDocument/2006/math" xmlns:a14="http://schemas.microsoft.com/office/drawing/2010/main" xmlns:ma14="http://schemas.microsoft.com/office/mac/drawingml/2011/main" val="1"/>
             </a:ext>
           </a:extLst>
         </p:spPr>
@@ -3378,7 +3380,7 @@
           </a:ln>
           <a:extLst>
             <a:ext uri="{C572A759-6A51-4108-AA02-DFA0A04FC94B}">
-              <ma14:wrappingTextBoxFlag xmlns:ma14="http://schemas.microsoft.com/office/mac/drawingml/2011/main" xmlns:a14="http://schemas.microsoft.com/office/drawing/2010/main" xmlns:m="http://schemas.openxmlformats.org/officeDocument/2006/math" xmlns="" val="1"/>
+              <ma14:wrappingTextBoxFlag xmlns="" xmlns:m="http://schemas.openxmlformats.org/officeDocument/2006/math" xmlns:a14="http://schemas.microsoft.com/office/drawing/2010/main" xmlns:ma14="http://schemas.microsoft.com/office/mac/drawingml/2011/main" val="1"/>
             </a:ext>
           </a:extLst>
         </p:spPr>
@@ -3565,7 +3567,7 @@
           </a:ln>
           <a:extLst>
             <a:ext uri="{C572A759-6A51-4108-AA02-DFA0A04FC94B}">
-              <ma14:wrappingTextBoxFlag xmlns:ma14="http://schemas.microsoft.com/office/mac/drawingml/2011/main" xmlns:a14="http://schemas.microsoft.com/office/drawing/2010/main" xmlns:m="http://schemas.openxmlformats.org/officeDocument/2006/math" xmlns="" val="1"/>
+              <ma14:wrappingTextBoxFlag xmlns="" xmlns:m="http://schemas.openxmlformats.org/officeDocument/2006/math" xmlns:a14="http://schemas.microsoft.com/office/drawing/2010/main" xmlns:ma14="http://schemas.microsoft.com/office/mac/drawingml/2011/main" val="1"/>
             </a:ext>
           </a:extLst>
         </p:spPr>
@@ -3612,7 +3614,7 @@
           </a:ln>
           <a:extLst>
             <a:ext uri="{C572A759-6A51-4108-AA02-DFA0A04FC94B}">
-              <ma14:wrappingTextBoxFlag xmlns:ma14="http://schemas.microsoft.com/office/mac/drawingml/2011/main" xmlns:a14="http://schemas.microsoft.com/office/drawing/2010/main" xmlns:m="http://schemas.openxmlformats.org/officeDocument/2006/math" xmlns="" val="1"/>
+              <ma14:wrappingTextBoxFlag xmlns="" xmlns:m="http://schemas.openxmlformats.org/officeDocument/2006/math" xmlns:a14="http://schemas.microsoft.com/office/drawing/2010/main" xmlns:ma14="http://schemas.microsoft.com/office/mac/drawingml/2011/main" val="1"/>
             </a:ext>
           </a:extLst>
         </p:spPr>
@@ -3765,7 +3767,7 @@
           </a:ln>
           <a:extLst>
             <a:ext uri="{C572A759-6A51-4108-AA02-DFA0A04FC94B}">
-              <ma14:wrappingTextBoxFlag xmlns:ma14="http://schemas.microsoft.com/office/mac/drawingml/2011/main" xmlns:a14="http://schemas.microsoft.com/office/drawing/2010/main" xmlns:m="http://schemas.openxmlformats.org/officeDocument/2006/math" xmlns="" val="1"/>
+              <ma14:wrappingTextBoxFlag xmlns="" xmlns:m="http://schemas.openxmlformats.org/officeDocument/2006/math" xmlns:a14="http://schemas.microsoft.com/office/drawing/2010/main" xmlns:ma14="http://schemas.microsoft.com/office/mac/drawingml/2011/main" val="1"/>
             </a:ext>
           </a:extLst>
         </p:spPr>
@@ -3952,7 +3954,7 @@
           </a:ln>
           <a:extLst>
             <a:ext uri="{C572A759-6A51-4108-AA02-DFA0A04FC94B}">
-              <ma14:wrappingTextBoxFlag xmlns:ma14="http://schemas.microsoft.com/office/mac/drawingml/2011/main" xmlns:a14="http://schemas.microsoft.com/office/drawing/2010/main" xmlns:m="http://schemas.openxmlformats.org/officeDocument/2006/math" xmlns="" val="1"/>
+              <ma14:wrappingTextBoxFlag xmlns="" xmlns:m="http://schemas.openxmlformats.org/officeDocument/2006/math" xmlns:a14="http://schemas.microsoft.com/office/drawing/2010/main" xmlns:ma14="http://schemas.microsoft.com/office/mac/drawingml/2011/main" val="1"/>
             </a:ext>
           </a:extLst>
         </p:spPr>
@@ -3999,7 +4001,7 @@
           </a:ln>
           <a:extLst>
             <a:ext uri="{C572A759-6A51-4108-AA02-DFA0A04FC94B}">
-              <ma14:wrappingTextBoxFlag xmlns:ma14="http://schemas.microsoft.com/office/mac/drawingml/2011/main" xmlns:a14="http://schemas.microsoft.com/office/drawing/2010/main" xmlns:m="http://schemas.openxmlformats.org/officeDocument/2006/math" xmlns="" val="1"/>
+              <ma14:wrappingTextBoxFlag xmlns="" xmlns:m="http://schemas.openxmlformats.org/officeDocument/2006/math" xmlns:a14="http://schemas.microsoft.com/office/drawing/2010/main" xmlns:ma14="http://schemas.microsoft.com/office/mac/drawingml/2011/main" val="1"/>
             </a:ext>
           </a:extLst>
         </p:spPr>
@@ -4166,7 +4168,7 @@
           </a:ln>
           <a:extLst>
             <a:ext uri="{C572A759-6A51-4108-AA02-DFA0A04FC94B}">
-              <ma14:wrappingTextBoxFlag xmlns:ma14="http://schemas.microsoft.com/office/mac/drawingml/2011/main" xmlns:a14="http://schemas.microsoft.com/office/drawing/2010/main" xmlns:m="http://schemas.openxmlformats.org/officeDocument/2006/math" xmlns="" val="1"/>
+              <ma14:wrappingTextBoxFlag xmlns="" xmlns:m="http://schemas.openxmlformats.org/officeDocument/2006/math" xmlns:a14="http://schemas.microsoft.com/office/drawing/2010/main" xmlns:ma14="http://schemas.microsoft.com/office/mac/drawingml/2011/main" val="1"/>
             </a:ext>
           </a:extLst>
         </p:spPr>
@@ -4213,7 +4215,7 @@
           </a:ln>
           <a:extLst>
             <a:ext uri="{C572A759-6A51-4108-AA02-DFA0A04FC94B}">
-              <ma14:wrappingTextBoxFlag xmlns:ma14="http://schemas.microsoft.com/office/mac/drawingml/2011/main" xmlns:a14="http://schemas.microsoft.com/office/drawing/2010/main" xmlns:m="http://schemas.openxmlformats.org/officeDocument/2006/math" xmlns="" val="1"/>
+              <ma14:wrappingTextBoxFlag xmlns="" xmlns:m="http://schemas.openxmlformats.org/officeDocument/2006/math" xmlns:a14="http://schemas.microsoft.com/office/drawing/2010/main" xmlns:ma14="http://schemas.microsoft.com/office/mac/drawingml/2011/main" val="1"/>
             </a:ext>
           </a:extLst>
         </p:spPr>
@@ -4260,7 +4262,7 @@
           </a:ln>
           <a:extLst>
             <a:ext uri="{C572A759-6A51-4108-AA02-DFA0A04FC94B}">
-              <ma14:wrappingTextBoxFlag xmlns:ma14="http://schemas.microsoft.com/office/mac/drawingml/2011/main" xmlns:a14="http://schemas.microsoft.com/office/drawing/2010/main" xmlns:m="http://schemas.openxmlformats.org/officeDocument/2006/math" xmlns="" val="1"/>
+              <ma14:wrappingTextBoxFlag xmlns="" xmlns:m="http://schemas.openxmlformats.org/officeDocument/2006/math" xmlns:a14="http://schemas.microsoft.com/office/drawing/2010/main" xmlns:ma14="http://schemas.microsoft.com/office/mac/drawingml/2011/main" val="1"/>
             </a:ext>
           </a:extLst>
         </p:spPr>
@@ -4410,7 +4412,7 @@
           </a:ln>
           <a:extLst>
             <a:ext uri="{C572A759-6A51-4108-AA02-DFA0A04FC94B}">
-              <ma14:wrappingTextBoxFlag xmlns:ma14="http://schemas.microsoft.com/office/mac/drawingml/2011/main" xmlns:a14="http://schemas.microsoft.com/office/drawing/2010/main" xmlns:m="http://schemas.openxmlformats.org/officeDocument/2006/math" xmlns="" val="1"/>
+              <ma14:wrappingTextBoxFlag xmlns="" xmlns:m="http://schemas.openxmlformats.org/officeDocument/2006/math" xmlns:a14="http://schemas.microsoft.com/office/drawing/2010/main" xmlns:ma14="http://schemas.microsoft.com/office/mac/drawingml/2011/main" val="1"/>
             </a:ext>
           </a:extLst>
         </p:spPr>
@@ -4563,7 +4565,7 @@
           </a:ln>
           <a:extLst>
             <a:ext uri="{C572A759-6A51-4108-AA02-DFA0A04FC94B}">
-              <ma14:wrappingTextBoxFlag xmlns:ma14="http://schemas.microsoft.com/office/mac/drawingml/2011/main" xmlns:a14="http://schemas.microsoft.com/office/drawing/2010/main" xmlns:m="http://schemas.openxmlformats.org/officeDocument/2006/math" xmlns="" val="1"/>
+              <ma14:wrappingTextBoxFlag xmlns="" xmlns:m="http://schemas.openxmlformats.org/officeDocument/2006/math" xmlns:a14="http://schemas.microsoft.com/office/drawing/2010/main" xmlns:ma14="http://schemas.microsoft.com/office/mac/drawingml/2011/main" val="1"/>
             </a:ext>
           </a:extLst>
         </p:spPr>
@@ -4610,7 +4612,7 @@
           </a:ln>
           <a:extLst>
             <a:ext uri="{C572A759-6A51-4108-AA02-DFA0A04FC94B}">
-              <ma14:wrappingTextBoxFlag xmlns:ma14="http://schemas.microsoft.com/office/mac/drawingml/2011/main" xmlns:a14="http://schemas.microsoft.com/office/drawing/2010/main" xmlns:m="http://schemas.openxmlformats.org/officeDocument/2006/math" xmlns="" val="1"/>
+              <ma14:wrappingTextBoxFlag xmlns="" xmlns:m="http://schemas.openxmlformats.org/officeDocument/2006/math" xmlns:a14="http://schemas.microsoft.com/office/drawing/2010/main" xmlns:ma14="http://schemas.microsoft.com/office/mac/drawingml/2011/main" val="1"/>
             </a:ext>
           </a:extLst>
         </p:spPr>
@@ -4678,7 +4680,7 @@
           </a:ln>
           <a:extLst>
             <a:ext uri="{C572A759-6A51-4108-AA02-DFA0A04FC94B}">
-              <ma14:wrappingTextBoxFlag xmlns:ma14="http://schemas.microsoft.com/office/mac/drawingml/2011/main" xmlns:a14="http://schemas.microsoft.com/office/drawing/2010/main" xmlns:m="http://schemas.openxmlformats.org/officeDocument/2006/math" xmlns="" val="1"/>
+              <ma14:wrappingTextBoxFlag xmlns="" xmlns:m="http://schemas.openxmlformats.org/officeDocument/2006/math" xmlns:a14="http://schemas.microsoft.com/office/drawing/2010/main" xmlns:ma14="http://schemas.microsoft.com/office/mac/drawingml/2011/main" val="1"/>
             </a:ext>
           </a:extLst>
         </p:spPr>
@@ -5195,7 +5197,7 @@
           </a:ln>
           <a:extLst>
             <a:ext uri="{C572A759-6A51-4108-AA02-DFA0A04FC94B}">
-              <ma14:wrappingTextBoxFlag xmlns:ma14="http://schemas.microsoft.com/office/mac/drawingml/2011/main" xmlns:a14="http://schemas.microsoft.com/office/drawing/2010/main" xmlns:m="http://schemas.openxmlformats.org/officeDocument/2006/math" xmlns="" val="1"/>
+              <ma14:wrappingTextBoxFlag xmlns="" xmlns:m="http://schemas.openxmlformats.org/officeDocument/2006/math" xmlns:a14="http://schemas.microsoft.com/office/drawing/2010/main" xmlns:ma14="http://schemas.microsoft.com/office/mac/drawingml/2011/main" val="1"/>
             </a:ext>
           </a:extLst>
         </p:spPr>
@@ -5630,7 +5632,7 @@
           </a:ln>
           <a:extLst>
             <a:ext uri="{C572A759-6A51-4108-AA02-DFA0A04FC94B}">
-              <ma14:wrappingTextBoxFlag xmlns:ma14="http://schemas.microsoft.com/office/mac/drawingml/2011/main" xmlns:a14="http://schemas.microsoft.com/office/drawing/2010/main" xmlns:m="http://schemas.openxmlformats.org/officeDocument/2006/math" xmlns="" val="1"/>
+              <ma14:wrappingTextBoxFlag xmlns="" xmlns:m="http://schemas.openxmlformats.org/officeDocument/2006/math" xmlns:a14="http://schemas.microsoft.com/office/drawing/2010/main" xmlns:ma14="http://schemas.microsoft.com/office/mac/drawingml/2011/main" val="1"/>
             </a:ext>
           </a:extLst>
         </p:spPr>
@@ -5759,7 +5761,7 @@
           </a:ln>
           <a:extLst>
             <a:ext uri="{C572A759-6A51-4108-AA02-DFA0A04FC94B}">
-              <ma14:wrappingTextBoxFlag xmlns:ma14="http://schemas.microsoft.com/office/mac/drawingml/2011/main" xmlns:a14="http://schemas.microsoft.com/office/drawing/2010/main" xmlns:m="http://schemas.openxmlformats.org/officeDocument/2006/math" xmlns="" val="1"/>
+              <ma14:wrappingTextBoxFlag xmlns="" xmlns:m="http://schemas.openxmlformats.org/officeDocument/2006/math" xmlns:a14="http://schemas.microsoft.com/office/drawing/2010/main" xmlns:ma14="http://schemas.microsoft.com/office/mac/drawingml/2011/main" val="1"/>
             </a:ext>
           </a:extLst>
         </p:spPr>
@@ -5895,7 +5897,7 @@
           </a:ln>
           <a:extLst>
             <a:ext uri="{C572A759-6A51-4108-AA02-DFA0A04FC94B}">
-              <ma14:wrappingTextBoxFlag xmlns:ma14="http://schemas.microsoft.com/office/mac/drawingml/2011/main" xmlns:a14="http://schemas.microsoft.com/office/drawing/2010/main" xmlns:m="http://schemas.openxmlformats.org/officeDocument/2006/math" xmlns="" val="1"/>
+              <ma14:wrappingTextBoxFlag xmlns="" xmlns:m="http://schemas.openxmlformats.org/officeDocument/2006/math" xmlns:a14="http://schemas.microsoft.com/office/drawing/2010/main" xmlns:ma14="http://schemas.microsoft.com/office/mac/drawingml/2011/main" val="1"/>
             </a:ext>
           </a:extLst>
         </p:spPr>
@@ -5991,7 +5993,7 @@
           </a:ln>
           <a:extLst>
             <a:ext uri="{C572A759-6A51-4108-AA02-DFA0A04FC94B}">
-              <ma14:wrappingTextBoxFlag xmlns:ma14="http://schemas.microsoft.com/office/mac/drawingml/2011/main" xmlns:a14="http://schemas.microsoft.com/office/drawing/2010/main" xmlns:m="http://schemas.openxmlformats.org/officeDocument/2006/math" xmlns="" val="1"/>
+              <ma14:wrappingTextBoxFlag xmlns="" xmlns:m="http://schemas.openxmlformats.org/officeDocument/2006/math" xmlns:a14="http://schemas.microsoft.com/office/drawing/2010/main" xmlns:ma14="http://schemas.microsoft.com/office/mac/drawingml/2011/main" val="1"/>
             </a:ext>
           </a:extLst>
         </p:spPr>
@@ -6193,7 +6195,7 @@
           </a:ln>
           <a:extLst>
             <a:ext uri="{C572A759-6A51-4108-AA02-DFA0A04FC94B}">
-              <ma14:wrappingTextBoxFlag xmlns:ma14="http://schemas.microsoft.com/office/mac/drawingml/2011/main" xmlns:a14="http://schemas.microsoft.com/office/drawing/2010/main" xmlns:m="http://schemas.openxmlformats.org/officeDocument/2006/math" xmlns="" val="1"/>
+              <ma14:wrappingTextBoxFlag xmlns="" xmlns:m="http://schemas.openxmlformats.org/officeDocument/2006/math" xmlns:a14="http://schemas.microsoft.com/office/drawing/2010/main" xmlns:ma14="http://schemas.microsoft.com/office/mac/drawingml/2011/main" val="1"/>
             </a:ext>
           </a:extLst>
         </p:spPr>
@@ -6238,7 +6240,7 @@
           </a:ln>
           <a:extLst>
             <a:ext uri="{C572A759-6A51-4108-AA02-DFA0A04FC94B}">
-              <ma14:wrappingTextBoxFlag xmlns:ma14="http://schemas.microsoft.com/office/mac/drawingml/2011/main" xmlns:a14="http://schemas.microsoft.com/office/drawing/2010/main" xmlns:m="http://schemas.openxmlformats.org/officeDocument/2006/math" xmlns="" val="1"/>
+              <ma14:wrappingTextBoxFlag xmlns="" xmlns:m="http://schemas.openxmlformats.org/officeDocument/2006/math" xmlns:a14="http://schemas.microsoft.com/office/drawing/2010/main" xmlns:ma14="http://schemas.microsoft.com/office/mac/drawingml/2011/main" val="1"/>
             </a:ext>
           </a:extLst>
         </p:spPr>
@@ -6327,7 +6329,7 @@
           </a:ln>
           <a:extLst>
             <a:ext uri="{C572A759-6A51-4108-AA02-DFA0A04FC94B}">
-              <ma14:wrappingTextBoxFlag xmlns:ma14="http://schemas.microsoft.com/office/mac/drawingml/2011/main" xmlns:a14="http://schemas.microsoft.com/office/drawing/2010/main" xmlns:m="http://schemas.openxmlformats.org/officeDocument/2006/math" xmlns="" val="1"/>
+              <ma14:wrappingTextBoxFlag xmlns="" xmlns:m="http://schemas.openxmlformats.org/officeDocument/2006/math" xmlns:a14="http://schemas.microsoft.com/office/drawing/2010/main" xmlns:ma14="http://schemas.microsoft.com/office/mac/drawingml/2011/main" val="1"/>
             </a:ext>
           </a:extLst>
         </p:spPr>
@@ -6518,7 +6520,7 @@
           </a:ln>
           <a:extLst>
             <a:ext uri="{C572A759-6A51-4108-AA02-DFA0A04FC94B}">
-              <ma14:wrappingTextBoxFlag xmlns:ma14="http://schemas.microsoft.com/office/mac/drawingml/2011/main" xmlns:a14="http://schemas.microsoft.com/office/drawing/2010/main" xmlns:m="http://schemas.openxmlformats.org/officeDocument/2006/math" xmlns="" val="1"/>
+              <ma14:wrappingTextBoxFlag xmlns="" xmlns:m="http://schemas.openxmlformats.org/officeDocument/2006/math" xmlns:a14="http://schemas.microsoft.com/office/drawing/2010/main" xmlns:ma14="http://schemas.microsoft.com/office/mac/drawingml/2011/main" val="1"/>
             </a:ext>
           </a:extLst>
         </p:spPr>
@@ -6595,7 +6597,7 @@
           </a:ln>
           <a:extLst>
             <a:ext uri="{C572A759-6A51-4108-AA02-DFA0A04FC94B}">
-              <ma14:wrappingTextBoxFlag xmlns:ma14="http://schemas.microsoft.com/office/mac/drawingml/2011/main" xmlns:a14="http://schemas.microsoft.com/office/drawing/2010/main" xmlns:m="http://schemas.openxmlformats.org/officeDocument/2006/math" xmlns="" val="1"/>
+              <ma14:wrappingTextBoxFlag xmlns="" xmlns:m="http://schemas.openxmlformats.org/officeDocument/2006/math" xmlns:a14="http://schemas.microsoft.com/office/drawing/2010/main" xmlns:ma14="http://schemas.microsoft.com/office/mac/drawingml/2011/main" val="1"/>
             </a:ext>
           </a:extLst>
         </p:spPr>
@@ -6648,7 +6650,7 @@
           </a:ln>
           <a:extLst>
             <a:ext uri="{C572A759-6A51-4108-AA02-DFA0A04FC94B}">
-              <ma14:wrappingTextBoxFlag xmlns:ma14="http://schemas.microsoft.com/office/mac/drawingml/2011/main" xmlns:a14="http://schemas.microsoft.com/office/drawing/2010/main" xmlns:m="http://schemas.openxmlformats.org/officeDocument/2006/math" xmlns="" val="1"/>
+              <ma14:wrappingTextBoxFlag xmlns="" xmlns:m="http://schemas.openxmlformats.org/officeDocument/2006/math" xmlns:a14="http://schemas.microsoft.com/office/drawing/2010/main" xmlns:ma14="http://schemas.microsoft.com/office/mac/drawingml/2011/main" val="1"/>
             </a:ext>
           </a:extLst>
         </p:spPr>
@@ -6701,7 +6703,7 @@
           </a:ln>
           <a:extLst>
             <a:ext uri="{C572A759-6A51-4108-AA02-DFA0A04FC94B}">
-              <ma14:wrappingTextBoxFlag xmlns:ma14="http://schemas.microsoft.com/office/mac/drawingml/2011/main" xmlns:a14="http://schemas.microsoft.com/office/drawing/2010/main" xmlns:m="http://schemas.openxmlformats.org/officeDocument/2006/math" xmlns="" val="1"/>
+              <ma14:wrappingTextBoxFlag xmlns="" xmlns:m="http://schemas.openxmlformats.org/officeDocument/2006/math" xmlns:a14="http://schemas.microsoft.com/office/drawing/2010/main" xmlns:ma14="http://schemas.microsoft.com/office/mac/drawingml/2011/main" val="1"/>
             </a:ext>
           </a:extLst>
         </p:spPr>
@@ -6751,7 +6753,7 @@
           </a:ln>
           <a:extLst>
             <a:ext uri="{C572A759-6A51-4108-AA02-DFA0A04FC94B}">
-              <ma14:wrappingTextBoxFlag xmlns:ma14="http://schemas.microsoft.com/office/mac/drawingml/2011/main" xmlns:a14="http://schemas.microsoft.com/office/drawing/2010/main" xmlns:m="http://schemas.openxmlformats.org/officeDocument/2006/math" xmlns="" val="1"/>
+              <ma14:wrappingTextBoxFlag xmlns="" xmlns:m="http://schemas.openxmlformats.org/officeDocument/2006/math" xmlns:a14="http://schemas.microsoft.com/office/drawing/2010/main" xmlns:ma14="http://schemas.microsoft.com/office/mac/drawingml/2011/main" val="1"/>
             </a:ext>
           </a:extLst>
         </p:spPr>
@@ -6801,7 +6803,7 @@
           </a:ln>
           <a:extLst>
             <a:ext uri="{C572A759-6A51-4108-AA02-DFA0A04FC94B}">
-              <ma14:wrappingTextBoxFlag xmlns:ma14="http://schemas.microsoft.com/office/mac/drawingml/2011/main" xmlns:a14="http://schemas.microsoft.com/office/drawing/2010/main" xmlns:m="http://schemas.openxmlformats.org/officeDocument/2006/math" xmlns="" val="1"/>
+              <ma14:wrappingTextBoxFlag xmlns="" xmlns:m="http://schemas.openxmlformats.org/officeDocument/2006/math" xmlns:a14="http://schemas.microsoft.com/office/drawing/2010/main" xmlns:ma14="http://schemas.microsoft.com/office/mac/drawingml/2011/main" val="1"/>
             </a:ext>
           </a:extLst>
         </p:spPr>
@@ -6851,7 +6853,7 @@
           </a:ln>
           <a:extLst>
             <a:ext uri="{C572A759-6A51-4108-AA02-DFA0A04FC94B}">
-              <ma14:wrappingTextBoxFlag xmlns:ma14="http://schemas.microsoft.com/office/mac/drawingml/2011/main" xmlns:a14="http://schemas.microsoft.com/office/drawing/2010/main" xmlns:m="http://schemas.openxmlformats.org/officeDocument/2006/math" xmlns="" val="1"/>
+              <ma14:wrappingTextBoxFlag xmlns="" xmlns:m="http://schemas.openxmlformats.org/officeDocument/2006/math" xmlns:a14="http://schemas.microsoft.com/office/drawing/2010/main" xmlns:ma14="http://schemas.microsoft.com/office/mac/drawingml/2011/main" val="1"/>
             </a:ext>
           </a:extLst>
         </p:spPr>
@@ -6893,7 +6895,7 @@
           </a:ln>
           <a:extLst>
             <a:ext uri="{C572A759-6A51-4108-AA02-DFA0A04FC94B}">
-              <ma14:wrappingTextBoxFlag xmlns:ma14="http://schemas.microsoft.com/office/mac/drawingml/2011/main" xmlns:a14="http://schemas.microsoft.com/office/drawing/2010/main" xmlns:m="http://schemas.openxmlformats.org/officeDocument/2006/math" xmlns="" val="1"/>
+              <ma14:wrappingTextBoxFlag xmlns="" xmlns:m="http://schemas.openxmlformats.org/officeDocument/2006/math" xmlns:a14="http://schemas.microsoft.com/office/drawing/2010/main" xmlns:ma14="http://schemas.microsoft.com/office/mac/drawingml/2011/main" val="1"/>
             </a:ext>
           </a:extLst>
         </p:spPr>
@@ -7100,7 +7102,7 @@
           </a:ln>
           <a:extLst>
             <a:ext uri="{C572A759-6A51-4108-AA02-DFA0A04FC94B}">
-              <ma14:wrappingTextBoxFlag xmlns:ma14="http://schemas.microsoft.com/office/mac/drawingml/2011/main" xmlns:a14="http://schemas.microsoft.com/office/drawing/2010/main" xmlns:m="http://schemas.openxmlformats.org/officeDocument/2006/math" xmlns="" val="1"/>
+              <ma14:wrappingTextBoxFlag xmlns="" xmlns:m="http://schemas.openxmlformats.org/officeDocument/2006/math" xmlns:a14="http://schemas.microsoft.com/office/drawing/2010/main" xmlns:ma14="http://schemas.microsoft.com/office/mac/drawingml/2011/main" val="1"/>
             </a:ext>
           </a:extLst>
         </p:spPr>
@@ -7184,7 +7186,7 @@
           </a:ln>
           <a:extLst>
             <a:ext uri="{C572A759-6A51-4108-AA02-DFA0A04FC94B}">
-              <ma14:wrappingTextBoxFlag xmlns:ma14="http://schemas.microsoft.com/office/mac/drawingml/2011/main" xmlns:a14="http://schemas.microsoft.com/office/drawing/2010/main" xmlns:m="http://schemas.openxmlformats.org/officeDocument/2006/math" xmlns="" val="1"/>
+              <ma14:wrappingTextBoxFlag xmlns="" xmlns:m="http://schemas.openxmlformats.org/officeDocument/2006/math" xmlns:a14="http://schemas.microsoft.com/office/drawing/2010/main" xmlns:ma14="http://schemas.microsoft.com/office/mac/drawingml/2011/main" val="1"/>
             </a:ext>
           </a:extLst>
         </p:spPr>
@@ -7268,7 +7270,7 @@
           </a:ln>
           <a:extLst>
             <a:ext uri="{C572A759-6A51-4108-AA02-DFA0A04FC94B}">
-              <ma14:wrappingTextBoxFlag xmlns:ma14="http://schemas.microsoft.com/office/mac/drawingml/2011/main" xmlns:a14="http://schemas.microsoft.com/office/drawing/2010/main" xmlns:m="http://schemas.openxmlformats.org/officeDocument/2006/math" xmlns="" val="1"/>
+              <ma14:wrappingTextBoxFlag xmlns="" xmlns:m="http://schemas.openxmlformats.org/officeDocument/2006/math" xmlns:a14="http://schemas.microsoft.com/office/drawing/2010/main" xmlns:ma14="http://schemas.microsoft.com/office/mac/drawingml/2011/main" val="1"/>
             </a:ext>
           </a:extLst>
         </p:spPr>
@@ -7352,7 +7354,7 @@
           </a:ln>
           <a:extLst>
             <a:ext uri="{C572A759-6A51-4108-AA02-DFA0A04FC94B}">
-              <ma14:wrappingTextBoxFlag xmlns:ma14="http://schemas.microsoft.com/office/mac/drawingml/2011/main" xmlns:a14="http://schemas.microsoft.com/office/drawing/2010/main" xmlns:m="http://schemas.openxmlformats.org/officeDocument/2006/math" xmlns="" val="1"/>
+              <ma14:wrappingTextBoxFlag xmlns="" xmlns:m="http://schemas.openxmlformats.org/officeDocument/2006/math" xmlns:a14="http://schemas.microsoft.com/office/drawing/2010/main" xmlns:ma14="http://schemas.microsoft.com/office/mac/drawingml/2011/main" val="1"/>
             </a:ext>
           </a:extLst>
         </p:spPr>
@@ -7395,7 +7397,7 @@
           </a:ln>
           <a:extLst>
             <a:ext uri="{C572A759-6A51-4108-AA02-DFA0A04FC94B}">
-              <ma14:wrappingTextBoxFlag xmlns:ma14="http://schemas.microsoft.com/office/mac/drawingml/2011/main" xmlns:a14="http://schemas.microsoft.com/office/drawing/2010/main" xmlns:m="http://schemas.openxmlformats.org/officeDocument/2006/math" xmlns="" val="1"/>
+              <ma14:wrappingTextBoxFlag xmlns="" xmlns:m="http://schemas.openxmlformats.org/officeDocument/2006/math" xmlns:a14="http://schemas.microsoft.com/office/drawing/2010/main" xmlns:ma14="http://schemas.microsoft.com/office/mac/drawingml/2011/main" val="1"/>
             </a:ext>
           </a:extLst>
         </p:spPr>
@@ -7441,7 +7443,7 @@
           </a:ln>
           <a:extLst>
             <a:ext uri="{C572A759-6A51-4108-AA02-DFA0A04FC94B}">
-              <ma14:wrappingTextBoxFlag xmlns:ma14="http://schemas.microsoft.com/office/mac/drawingml/2011/main" xmlns:a14="http://schemas.microsoft.com/office/drawing/2010/main" xmlns:m="http://schemas.openxmlformats.org/officeDocument/2006/math" xmlns="" val="1"/>
+              <ma14:wrappingTextBoxFlag xmlns="" xmlns:m="http://schemas.openxmlformats.org/officeDocument/2006/math" xmlns:a14="http://schemas.microsoft.com/office/drawing/2010/main" xmlns:ma14="http://schemas.microsoft.com/office/mac/drawingml/2011/main" val="1"/>
             </a:ext>
           </a:extLst>
         </p:spPr>
@@ -7492,7 +7494,7 @@
           </a:ln>
           <a:extLst>
             <a:ext uri="{C572A759-6A51-4108-AA02-DFA0A04FC94B}">
-              <ma14:wrappingTextBoxFlag xmlns:ma14="http://schemas.microsoft.com/office/mac/drawingml/2011/main" xmlns:a14="http://schemas.microsoft.com/office/drawing/2010/main" xmlns:m="http://schemas.openxmlformats.org/officeDocument/2006/math" xmlns="" val="1"/>
+              <ma14:wrappingTextBoxFlag xmlns="" xmlns:m="http://schemas.openxmlformats.org/officeDocument/2006/math" xmlns:a14="http://schemas.microsoft.com/office/drawing/2010/main" xmlns:ma14="http://schemas.microsoft.com/office/mac/drawingml/2011/main" val="1"/>
             </a:ext>
           </a:extLst>
         </p:spPr>
@@ -7689,7 +7691,7 @@
           </a:ln>
           <a:extLst>
             <a:ext uri="{C572A759-6A51-4108-AA02-DFA0A04FC94B}">
-              <ma14:wrappingTextBoxFlag xmlns:ma14="http://schemas.microsoft.com/office/mac/drawingml/2011/main" xmlns:a14="http://schemas.microsoft.com/office/drawing/2010/main" xmlns:m="http://schemas.openxmlformats.org/officeDocument/2006/math" xmlns="" val="1"/>
+              <ma14:wrappingTextBoxFlag xmlns="" xmlns:m="http://schemas.openxmlformats.org/officeDocument/2006/math" xmlns:a14="http://schemas.microsoft.com/office/drawing/2010/main" xmlns:ma14="http://schemas.microsoft.com/office/mac/drawingml/2011/main" val="1"/>
             </a:ext>
           </a:extLst>
         </p:spPr>
@@ -7767,7 +7769,7 @@
           </a:ln>
           <a:extLst>
             <a:ext uri="{C572A759-6A51-4108-AA02-DFA0A04FC94B}">
-              <ma14:wrappingTextBoxFlag xmlns:ma14="http://schemas.microsoft.com/office/mac/drawingml/2011/main" xmlns:a14="http://schemas.microsoft.com/office/drawing/2010/main" xmlns:m="http://schemas.openxmlformats.org/officeDocument/2006/math" xmlns="" val="1"/>
+              <ma14:wrappingTextBoxFlag xmlns="" xmlns:m="http://schemas.openxmlformats.org/officeDocument/2006/math" xmlns:a14="http://schemas.microsoft.com/office/drawing/2010/main" xmlns:ma14="http://schemas.microsoft.com/office/mac/drawingml/2011/main" val="1"/>
             </a:ext>
           </a:extLst>
         </p:spPr>
@@ -7898,7 +7900,7 @@
           </a:ln>
           <a:extLst>
             <a:ext uri="{C572A759-6A51-4108-AA02-DFA0A04FC94B}">
-              <ma14:wrappingTextBoxFlag xmlns:ma14="http://schemas.microsoft.com/office/mac/drawingml/2011/main" xmlns:a14="http://schemas.microsoft.com/office/drawing/2010/main" xmlns:m="http://schemas.openxmlformats.org/officeDocument/2006/math" xmlns="" val="1"/>
+              <ma14:wrappingTextBoxFlag xmlns="" xmlns:m="http://schemas.openxmlformats.org/officeDocument/2006/math" xmlns:a14="http://schemas.microsoft.com/office/drawing/2010/main" xmlns:ma14="http://schemas.microsoft.com/office/mac/drawingml/2011/main" val="1"/>
             </a:ext>
           </a:extLst>
         </p:spPr>
@@ -7953,7 +7955,7 @@
           </a:ln>
           <a:extLst>
             <a:ext uri="{C572A759-6A51-4108-AA02-DFA0A04FC94B}">
-              <ma14:wrappingTextBoxFlag xmlns:ma14="http://schemas.microsoft.com/office/mac/drawingml/2011/main" xmlns:a14="http://schemas.microsoft.com/office/drawing/2010/main" xmlns:m="http://schemas.openxmlformats.org/officeDocument/2006/math" xmlns="" val="1"/>
+              <ma14:wrappingTextBoxFlag xmlns="" xmlns:m="http://schemas.openxmlformats.org/officeDocument/2006/math" xmlns:a14="http://schemas.microsoft.com/office/drawing/2010/main" xmlns:ma14="http://schemas.microsoft.com/office/mac/drawingml/2011/main" val="1"/>
             </a:ext>
           </a:extLst>
         </p:spPr>
@@ -8000,7 +8002,7 @@
           </a:ln>
           <a:extLst>
             <a:ext uri="{C572A759-6A51-4108-AA02-DFA0A04FC94B}">
-              <ma14:wrappingTextBoxFlag xmlns:ma14="http://schemas.microsoft.com/office/mac/drawingml/2011/main" xmlns:a14="http://schemas.microsoft.com/office/drawing/2010/main" xmlns:m="http://schemas.openxmlformats.org/officeDocument/2006/math" xmlns="" val="1"/>
+              <ma14:wrappingTextBoxFlag xmlns="" xmlns:m="http://schemas.openxmlformats.org/officeDocument/2006/math" xmlns:a14="http://schemas.microsoft.com/office/drawing/2010/main" xmlns:ma14="http://schemas.microsoft.com/office/mac/drawingml/2011/main" val="1"/>
             </a:ext>
           </a:extLst>
         </p:spPr>
@@ -8088,7 +8090,7 @@
           </a:ln>
           <a:extLst>
             <a:ext uri="{C572A759-6A51-4108-AA02-DFA0A04FC94B}">
-              <ma14:wrappingTextBoxFlag xmlns:ma14="http://schemas.microsoft.com/office/mac/drawingml/2011/main" xmlns:a14="http://schemas.microsoft.com/office/drawing/2010/main" xmlns:m="http://schemas.openxmlformats.org/officeDocument/2006/math" xmlns="" val="1"/>
+              <ma14:wrappingTextBoxFlag xmlns="" xmlns:m="http://schemas.openxmlformats.org/officeDocument/2006/math" xmlns:a14="http://schemas.microsoft.com/office/drawing/2010/main" xmlns:ma14="http://schemas.microsoft.com/office/mac/drawingml/2011/main" val="1"/>
             </a:ext>
           </a:extLst>
         </p:spPr>
@@ -8279,7 +8281,7 @@
           </a:ln>
           <a:extLst>
             <a:ext uri="{C572A759-6A51-4108-AA02-DFA0A04FC94B}">
-              <ma14:wrappingTextBoxFlag xmlns:ma14="http://schemas.microsoft.com/office/mac/drawingml/2011/main" xmlns:a14="http://schemas.microsoft.com/office/drawing/2010/main" xmlns:m="http://schemas.openxmlformats.org/officeDocument/2006/math" xmlns="" val="1"/>
+              <ma14:wrappingTextBoxFlag xmlns="" xmlns:m="http://schemas.openxmlformats.org/officeDocument/2006/math" xmlns:a14="http://schemas.microsoft.com/office/drawing/2010/main" xmlns:ma14="http://schemas.microsoft.com/office/mac/drawingml/2011/main" val="1"/>
             </a:ext>
           </a:extLst>
         </p:spPr>
@@ -8356,7 +8358,7 @@
           </a:ln>
           <a:extLst>
             <a:ext uri="{C572A759-6A51-4108-AA02-DFA0A04FC94B}">
-              <ma14:wrappingTextBoxFlag xmlns:ma14="http://schemas.microsoft.com/office/mac/drawingml/2011/main" xmlns:a14="http://schemas.microsoft.com/office/drawing/2010/main" xmlns:m="http://schemas.openxmlformats.org/officeDocument/2006/math" xmlns="" val="1"/>
+              <ma14:wrappingTextBoxFlag xmlns="" xmlns:m="http://schemas.openxmlformats.org/officeDocument/2006/math" xmlns:a14="http://schemas.microsoft.com/office/drawing/2010/main" xmlns:ma14="http://schemas.microsoft.com/office/mac/drawingml/2011/main" val="1"/>
             </a:ext>
           </a:extLst>
         </p:spPr>
@@ -8409,7 +8411,7 @@
           </a:ln>
           <a:extLst>
             <a:ext uri="{C572A759-6A51-4108-AA02-DFA0A04FC94B}">
-              <ma14:wrappingTextBoxFlag xmlns:ma14="http://schemas.microsoft.com/office/mac/drawingml/2011/main" xmlns:a14="http://schemas.microsoft.com/office/drawing/2010/main" xmlns:m="http://schemas.openxmlformats.org/officeDocument/2006/math" xmlns="" val="1"/>
+              <ma14:wrappingTextBoxFlag xmlns="" xmlns:m="http://schemas.openxmlformats.org/officeDocument/2006/math" xmlns:a14="http://schemas.microsoft.com/office/drawing/2010/main" xmlns:ma14="http://schemas.microsoft.com/office/mac/drawingml/2011/main" val="1"/>
             </a:ext>
           </a:extLst>
         </p:spPr>
@@ -8462,7 +8464,7 @@
           </a:ln>
           <a:extLst>
             <a:ext uri="{C572A759-6A51-4108-AA02-DFA0A04FC94B}">
-              <ma14:wrappingTextBoxFlag xmlns:ma14="http://schemas.microsoft.com/office/mac/drawingml/2011/main" xmlns:a14="http://schemas.microsoft.com/office/drawing/2010/main" xmlns:m="http://schemas.openxmlformats.org/officeDocument/2006/math" xmlns="" val="1"/>
+              <ma14:wrappingTextBoxFlag xmlns="" xmlns:m="http://schemas.openxmlformats.org/officeDocument/2006/math" xmlns:a14="http://schemas.microsoft.com/office/drawing/2010/main" xmlns:ma14="http://schemas.microsoft.com/office/mac/drawingml/2011/main" val="1"/>
             </a:ext>
           </a:extLst>
         </p:spPr>
@@ -8512,7 +8514,7 @@
           </a:ln>
           <a:extLst>
             <a:ext uri="{C572A759-6A51-4108-AA02-DFA0A04FC94B}">
-              <ma14:wrappingTextBoxFlag xmlns:ma14="http://schemas.microsoft.com/office/mac/drawingml/2011/main" xmlns:a14="http://schemas.microsoft.com/office/drawing/2010/main" xmlns:m="http://schemas.openxmlformats.org/officeDocument/2006/math" xmlns="" val="1"/>
+              <ma14:wrappingTextBoxFlag xmlns="" xmlns:m="http://schemas.openxmlformats.org/officeDocument/2006/math" xmlns:a14="http://schemas.microsoft.com/office/drawing/2010/main" xmlns:ma14="http://schemas.microsoft.com/office/mac/drawingml/2011/main" val="1"/>
             </a:ext>
           </a:extLst>
         </p:spPr>
@@ -8562,7 +8564,7 @@
           </a:ln>
           <a:extLst>
             <a:ext uri="{C572A759-6A51-4108-AA02-DFA0A04FC94B}">
-              <ma14:wrappingTextBoxFlag xmlns:ma14="http://schemas.microsoft.com/office/mac/drawingml/2011/main" xmlns:a14="http://schemas.microsoft.com/office/drawing/2010/main" xmlns:m="http://schemas.openxmlformats.org/officeDocument/2006/math" xmlns="" val="1"/>
+              <ma14:wrappingTextBoxFlag xmlns="" xmlns:m="http://schemas.openxmlformats.org/officeDocument/2006/math" xmlns:a14="http://schemas.microsoft.com/office/drawing/2010/main" xmlns:ma14="http://schemas.microsoft.com/office/mac/drawingml/2011/main" val="1"/>
             </a:ext>
           </a:extLst>
         </p:spPr>
@@ -8612,7 +8614,7 @@
           </a:ln>
           <a:extLst>
             <a:ext uri="{C572A759-6A51-4108-AA02-DFA0A04FC94B}">
-              <ma14:wrappingTextBoxFlag xmlns:ma14="http://schemas.microsoft.com/office/mac/drawingml/2011/main" xmlns:a14="http://schemas.microsoft.com/office/drawing/2010/main" xmlns:m="http://schemas.openxmlformats.org/officeDocument/2006/math" xmlns="" val="1"/>
+              <ma14:wrappingTextBoxFlag xmlns="" xmlns:m="http://schemas.openxmlformats.org/officeDocument/2006/math" xmlns:a14="http://schemas.microsoft.com/office/drawing/2010/main" xmlns:ma14="http://schemas.microsoft.com/office/mac/drawingml/2011/main" val="1"/>
             </a:ext>
           </a:extLst>
         </p:spPr>
@@ -8654,7 +8656,7 @@
           </a:ln>
           <a:extLst>
             <a:ext uri="{C572A759-6A51-4108-AA02-DFA0A04FC94B}">
-              <ma14:wrappingTextBoxFlag xmlns:ma14="http://schemas.microsoft.com/office/mac/drawingml/2011/main" xmlns:a14="http://schemas.microsoft.com/office/drawing/2010/main" xmlns:m="http://schemas.openxmlformats.org/officeDocument/2006/math" xmlns="" val="1"/>
+              <ma14:wrappingTextBoxFlag xmlns="" xmlns:m="http://schemas.openxmlformats.org/officeDocument/2006/math" xmlns:a14="http://schemas.microsoft.com/office/drawing/2010/main" xmlns:ma14="http://schemas.microsoft.com/office/mac/drawingml/2011/main" val="1"/>
             </a:ext>
           </a:extLst>
         </p:spPr>
@@ -8861,7 +8863,7 @@
           </a:ln>
           <a:extLst>
             <a:ext uri="{C572A759-6A51-4108-AA02-DFA0A04FC94B}">
-              <ma14:wrappingTextBoxFlag xmlns:ma14="http://schemas.microsoft.com/office/mac/drawingml/2011/main" xmlns:a14="http://schemas.microsoft.com/office/drawing/2010/main" xmlns:m="http://schemas.openxmlformats.org/officeDocument/2006/math" xmlns="" val="1"/>
+              <ma14:wrappingTextBoxFlag xmlns="" xmlns:m="http://schemas.openxmlformats.org/officeDocument/2006/math" xmlns:a14="http://schemas.microsoft.com/office/drawing/2010/main" xmlns:ma14="http://schemas.microsoft.com/office/mac/drawingml/2011/main" val="1"/>
             </a:ext>
           </a:extLst>
         </p:spPr>
@@ -8945,7 +8947,7 @@
           </a:ln>
           <a:extLst>
             <a:ext uri="{C572A759-6A51-4108-AA02-DFA0A04FC94B}">
-              <ma14:wrappingTextBoxFlag xmlns:ma14="http://schemas.microsoft.com/office/mac/drawingml/2011/main" xmlns:a14="http://schemas.microsoft.com/office/drawing/2010/main" xmlns:m="http://schemas.openxmlformats.org/officeDocument/2006/math" xmlns="" val="1"/>
+              <ma14:wrappingTextBoxFlag xmlns="" xmlns:m="http://schemas.openxmlformats.org/officeDocument/2006/math" xmlns:a14="http://schemas.microsoft.com/office/drawing/2010/main" xmlns:ma14="http://schemas.microsoft.com/office/mac/drawingml/2011/main" val="1"/>
             </a:ext>
           </a:extLst>
         </p:spPr>
@@ -9029,7 +9031,7 @@
           </a:ln>
           <a:extLst>
             <a:ext uri="{C572A759-6A51-4108-AA02-DFA0A04FC94B}">
-              <ma14:wrappingTextBoxFlag xmlns:ma14="http://schemas.microsoft.com/office/mac/drawingml/2011/main" xmlns:a14="http://schemas.microsoft.com/office/drawing/2010/main" xmlns:m="http://schemas.openxmlformats.org/officeDocument/2006/math" xmlns="" val="1"/>
+              <ma14:wrappingTextBoxFlag xmlns="" xmlns:m="http://schemas.openxmlformats.org/officeDocument/2006/math" xmlns:a14="http://schemas.microsoft.com/office/drawing/2010/main" xmlns:ma14="http://schemas.microsoft.com/office/mac/drawingml/2011/main" val="1"/>
             </a:ext>
           </a:extLst>
         </p:spPr>
@@ -9113,7 +9115,7 @@
           </a:ln>
           <a:extLst>
             <a:ext uri="{C572A759-6A51-4108-AA02-DFA0A04FC94B}">
-              <ma14:wrappingTextBoxFlag xmlns:ma14="http://schemas.microsoft.com/office/mac/drawingml/2011/main" xmlns:a14="http://schemas.microsoft.com/office/drawing/2010/main" xmlns:m="http://schemas.openxmlformats.org/officeDocument/2006/math" xmlns="" val="1"/>
+              <ma14:wrappingTextBoxFlag xmlns="" xmlns:m="http://schemas.openxmlformats.org/officeDocument/2006/math" xmlns:a14="http://schemas.microsoft.com/office/drawing/2010/main" xmlns:ma14="http://schemas.microsoft.com/office/mac/drawingml/2011/main" val="1"/>
             </a:ext>
           </a:extLst>
         </p:spPr>
@@ -9156,7 +9158,7 @@
           </a:ln>
           <a:extLst>
             <a:ext uri="{C572A759-6A51-4108-AA02-DFA0A04FC94B}">
-              <ma14:wrappingTextBoxFlag xmlns:ma14="http://schemas.microsoft.com/office/mac/drawingml/2011/main" xmlns:a14="http://schemas.microsoft.com/office/drawing/2010/main" xmlns:m="http://schemas.openxmlformats.org/officeDocument/2006/math" xmlns="" val="1"/>
+              <ma14:wrappingTextBoxFlag xmlns="" xmlns:m="http://schemas.openxmlformats.org/officeDocument/2006/math" xmlns:a14="http://schemas.microsoft.com/office/drawing/2010/main" xmlns:ma14="http://schemas.microsoft.com/office/mac/drawingml/2011/main" val="1"/>
             </a:ext>
           </a:extLst>
         </p:spPr>
@@ -9202,7 +9204,7 @@
           </a:ln>
           <a:extLst>
             <a:ext uri="{C572A759-6A51-4108-AA02-DFA0A04FC94B}">
-              <ma14:wrappingTextBoxFlag xmlns:ma14="http://schemas.microsoft.com/office/mac/drawingml/2011/main" xmlns:a14="http://schemas.microsoft.com/office/drawing/2010/main" xmlns:m="http://schemas.openxmlformats.org/officeDocument/2006/math" xmlns="" val="1"/>
+              <ma14:wrappingTextBoxFlag xmlns="" xmlns:m="http://schemas.openxmlformats.org/officeDocument/2006/math" xmlns:a14="http://schemas.microsoft.com/office/drawing/2010/main" xmlns:ma14="http://schemas.microsoft.com/office/mac/drawingml/2011/main" val="1"/>
             </a:ext>
           </a:extLst>
         </p:spPr>
@@ -9253,7 +9255,7 @@
           </a:ln>
           <a:extLst>
             <a:ext uri="{C572A759-6A51-4108-AA02-DFA0A04FC94B}">
-              <ma14:wrappingTextBoxFlag xmlns:ma14="http://schemas.microsoft.com/office/mac/drawingml/2011/main" xmlns:a14="http://schemas.microsoft.com/office/drawing/2010/main" xmlns:m="http://schemas.openxmlformats.org/officeDocument/2006/math" xmlns="" val="1"/>
+              <ma14:wrappingTextBoxFlag xmlns="" xmlns:m="http://schemas.openxmlformats.org/officeDocument/2006/math" xmlns:a14="http://schemas.microsoft.com/office/drawing/2010/main" xmlns:ma14="http://schemas.microsoft.com/office/mac/drawingml/2011/main" val="1"/>
             </a:ext>
           </a:extLst>
         </p:spPr>
@@ -9450,7 +9452,7 @@
           </a:ln>
           <a:extLst>
             <a:ext uri="{C572A759-6A51-4108-AA02-DFA0A04FC94B}">
-              <ma14:wrappingTextBoxFlag xmlns:ma14="http://schemas.microsoft.com/office/mac/drawingml/2011/main" xmlns:a14="http://schemas.microsoft.com/office/drawing/2010/main" xmlns:m="http://schemas.openxmlformats.org/officeDocument/2006/math" xmlns="" val="1"/>
+              <ma14:wrappingTextBoxFlag xmlns="" xmlns:m="http://schemas.openxmlformats.org/officeDocument/2006/math" xmlns:a14="http://schemas.microsoft.com/office/drawing/2010/main" xmlns:ma14="http://schemas.microsoft.com/office/mac/drawingml/2011/main" val="1"/>
             </a:ext>
           </a:extLst>
         </p:spPr>
@@ -9528,7 +9530,7 @@
           </a:ln>
           <a:extLst>
             <a:ext uri="{C572A759-6A51-4108-AA02-DFA0A04FC94B}">
-              <ma14:wrappingTextBoxFlag xmlns:ma14="http://schemas.microsoft.com/office/mac/drawingml/2011/main" xmlns:a14="http://schemas.microsoft.com/office/drawing/2010/main" xmlns:m="http://schemas.openxmlformats.org/officeDocument/2006/math" xmlns="" val="1"/>
+              <ma14:wrappingTextBoxFlag xmlns="" xmlns:m="http://schemas.openxmlformats.org/officeDocument/2006/math" xmlns:a14="http://schemas.microsoft.com/office/drawing/2010/main" xmlns:ma14="http://schemas.microsoft.com/office/mac/drawingml/2011/main" val="1"/>
             </a:ext>
           </a:extLst>
         </p:spPr>
@@ -9659,7 +9661,7 @@
           </a:ln>
           <a:extLst>
             <a:ext uri="{C572A759-6A51-4108-AA02-DFA0A04FC94B}">
-              <ma14:wrappingTextBoxFlag xmlns:ma14="http://schemas.microsoft.com/office/mac/drawingml/2011/main" xmlns:a14="http://schemas.microsoft.com/office/drawing/2010/main" xmlns:m="http://schemas.openxmlformats.org/officeDocument/2006/math" xmlns="" val="1"/>
+              <ma14:wrappingTextBoxFlag xmlns="" xmlns:m="http://schemas.openxmlformats.org/officeDocument/2006/math" xmlns:a14="http://schemas.microsoft.com/office/drawing/2010/main" xmlns:ma14="http://schemas.microsoft.com/office/mac/drawingml/2011/main" val="1"/>
             </a:ext>
           </a:extLst>
         </p:spPr>
@@ -9714,7 +9716,7 @@
           </a:ln>
           <a:extLst>
             <a:ext uri="{C572A759-6A51-4108-AA02-DFA0A04FC94B}">
-              <ma14:wrappingTextBoxFlag xmlns:ma14="http://schemas.microsoft.com/office/mac/drawingml/2011/main" xmlns:a14="http://schemas.microsoft.com/office/drawing/2010/main" xmlns:m="http://schemas.openxmlformats.org/officeDocument/2006/math" xmlns="" val="1"/>
+              <ma14:wrappingTextBoxFlag xmlns="" xmlns:m="http://schemas.openxmlformats.org/officeDocument/2006/math" xmlns:a14="http://schemas.microsoft.com/office/drawing/2010/main" xmlns:ma14="http://schemas.microsoft.com/office/mac/drawingml/2011/main" val="1"/>
             </a:ext>
           </a:extLst>
         </p:spPr>
@@ -9761,7 +9763,7 @@
           </a:ln>
           <a:extLst>
             <a:ext uri="{C572A759-6A51-4108-AA02-DFA0A04FC94B}">
-              <ma14:wrappingTextBoxFlag xmlns:ma14="http://schemas.microsoft.com/office/mac/drawingml/2011/main" xmlns:a14="http://schemas.microsoft.com/office/drawing/2010/main" xmlns:m="http://schemas.openxmlformats.org/officeDocument/2006/math" xmlns="" val="1"/>
+              <ma14:wrappingTextBoxFlag xmlns="" xmlns:m="http://schemas.openxmlformats.org/officeDocument/2006/math" xmlns:a14="http://schemas.microsoft.com/office/drawing/2010/main" xmlns:ma14="http://schemas.microsoft.com/office/mac/drawingml/2011/main" val="1"/>
             </a:ext>
           </a:extLst>
         </p:spPr>
@@ -9826,7 +9828,7 @@
           </a:ln>
           <a:extLst>
             <a:ext uri="{C572A759-6A51-4108-AA02-DFA0A04FC94B}">
-              <ma14:wrappingTextBoxFlag xmlns:ma14="http://schemas.microsoft.com/office/mac/drawingml/2011/main" xmlns:a14="http://schemas.microsoft.com/office/drawing/2010/main" xmlns:m="http://schemas.openxmlformats.org/officeDocument/2006/math" xmlns="" val="1"/>
+              <ma14:wrappingTextBoxFlag xmlns="" xmlns:m="http://schemas.openxmlformats.org/officeDocument/2006/math" xmlns:a14="http://schemas.microsoft.com/office/drawing/2010/main" xmlns:ma14="http://schemas.microsoft.com/office/mac/drawingml/2011/main" val="1"/>
             </a:ext>
           </a:extLst>
         </p:spPr>
@@ -9920,7 +9922,7 @@
           </a:ln>
           <a:extLst>
             <a:ext uri="{C572A759-6A51-4108-AA02-DFA0A04FC94B}">
-              <ma14:wrappingTextBoxFlag xmlns:ma14="http://schemas.microsoft.com/office/mac/drawingml/2011/main" xmlns:a14="http://schemas.microsoft.com/office/drawing/2010/main" xmlns:m="http://schemas.openxmlformats.org/officeDocument/2006/math" xmlns="" val="1"/>
+              <ma14:wrappingTextBoxFlag xmlns="" xmlns:m="http://schemas.openxmlformats.org/officeDocument/2006/math" xmlns:a14="http://schemas.microsoft.com/office/drawing/2010/main" xmlns:ma14="http://schemas.microsoft.com/office/mac/drawingml/2011/main" val="1"/>
             </a:ext>
           </a:extLst>
         </p:spPr>
@@ -10014,7 +10016,7 @@
           </a:ln>
           <a:extLst>
             <a:ext uri="{C572A759-6A51-4108-AA02-DFA0A04FC94B}">
-              <ma14:wrappingTextBoxFlag xmlns:ma14="http://schemas.microsoft.com/office/mac/drawingml/2011/main" xmlns:a14="http://schemas.microsoft.com/office/drawing/2010/main" xmlns:m="http://schemas.openxmlformats.org/officeDocument/2006/math" xmlns="" val="1"/>
+              <ma14:wrappingTextBoxFlag xmlns="" xmlns:m="http://schemas.openxmlformats.org/officeDocument/2006/math" xmlns:a14="http://schemas.microsoft.com/office/drawing/2010/main" xmlns:ma14="http://schemas.microsoft.com/office/mac/drawingml/2011/main" val="1"/>
             </a:ext>
           </a:extLst>
         </p:spPr>
@@ -10436,7 +10438,7 @@
           </a:ln>
           <a:extLst>
             <a:ext uri="{C572A759-6A51-4108-AA02-DFA0A04FC94B}">
-              <ma14:wrappingTextBoxFlag xmlns:ma14="http://schemas.microsoft.com/office/mac/drawingml/2011/main" xmlns:a14="http://schemas.microsoft.com/office/drawing/2010/main" xmlns:m="http://schemas.openxmlformats.org/officeDocument/2006/math" xmlns="" val="1"/>
+              <ma14:wrappingTextBoxFlag xmlns="" xmlns:m="http://schemas.openxmlformats.org/officeDocument/2006/math" xmlns:a14="http://schemas.microsoft.com/office/drawing/2010/main" xmlns:ma14="http://schemas.microsoft.com/office/mac/drawingml/2011/main" val="1"/>
             </a:ext>
           </a:extLst>
         </p:spPr>
@@ -10641,7 +10643,7 @@
           </a:ln>
           <a:extLst>
             <a:ext uri="{C572A759-6A51-4108-AA02-DFA0A04FC94B}">
-              <ma14:wrappingTextBoxFlag xmlns:ma14="http://schemas.microsoft.com/office/mac/drawingml/2011/main" xmlns:a14="http://schemas.microsoft.com/office/drawing/2010/main" xmlns:m="http://schemas.openxmlformats.org/officeDocument/2006/math" xmlns="" val="1"/>
+              <ma14:wrappingTextBoxFlag xmlns="" xmlns:m="http://schemas.openxmlformats.org/officeDocument/2006/math" xmlns:a14="http://schemas.microsoft.com/office/drawing/2010/main" xmlns:ma14="http://schemas.microsoft.com/office/mac/drawingml/2011/main" val="1"/>
             </a:ext>
           </a:extLst>
         </p:spPr>
@@ -10689,7 +10691,7 @@
           </a:ln>
           <a:extLst>
             <a:ext uri="{C572A759-6A51-4108-AA02-DFA0A04FC94B}">
-              <ma14:wrappingTextBoxFlag xmlns:ma14="http://schemas.microsoft.com/office/mac/drawingml/2011/main" xmlns:a14="http://schemas.microsoft.com/office/drawing/2010/main" xmlns:m="http://schemas.openxmlformats.org/officeDocument/2006/math" xmlns="" val="1"/>
+              <ma14:wrappingTextBoxFlag xmlns="" xmlns:m="http://schemas.openxmlformats.org/officeDocument/2006/math" xmlns:a14="http://schemas.microsoft.com/office/drawing/2010/main" xmlns:ma14="http://schemas.microsoft.com/office/mac/drawingml/2011/main" val="1"/>
             </a:ext>
           </a:extLst>
         </p:spPr>
@@ -10734,7 +10736,7 @@
           </a:ln>
           <a:extLst>
             <a:ext uri="{C572A759-6A51-4108-AA02-DFA0A04FC94B}">
-              <ma14:wrappingTextBoxFlag xmlns:ma14="http://schemas.microsoft.com/office/mac/drawingml/2011/main" xmlns:a14="http://schemas.microsoft.com/office/drawing/2010/main" xmlns:m="http://schemas.openxmlformats.org/officeDocument/2006/math" xmlns="" val="1"/>
+              <ma14:wrappingTextBoxFlag xmlns="" xmlns:m="http://schemas.openxmlformats.org/officeDocument/2006/math" xmlns:a14="http://schemas.microsoft.com/office/drawing/2010/main" xmlns:ma14="http://schemas.microsoft.com/office/mac/drawingml/2011/main" val="1"/>
             </a:ext>
           </a:extLst>
         </p:spPr>
@@ -10782,7 +10784,7 @@
           </a:ln>
           <a:extLst>
             <a:ext uri="{C572A759-6A51-4108-AA02-DFA0A04FC94B}">
-              <ma14:wrappingTextBoxFlag xmlns:ma14="http://schemas.microsoft.com/office/mac/drawingml/2011/main" xmlns:a14="http://schemas.microsoft.com/office/drawing/2010/main" xmlns:m="http://schemas.openxmlformats.org/officeDocument/2006/math" xmlns="" val="1"/>
+              <ma14:wrappingTextBoxFlag xmlns="" xmlns:m="http://schemas.openxmlformats.org/officeDocument/2006/math" xmlns:a14="http://schemas.microsoft.com/office/drawing/2010/main" xmlns:ma14="http://schemas.microsoft.com/office/mac/drawingml/2011/main" val="1"/>
             </a:ext>
           </a:extLst>
         </p:spPr>
@@ -11143,7 +11145,7 @@
           </a:ln>
           <a:extLst>
             <a:ext uri="{C572A759-6A51-4108-AA02-DFA0A04FC94B}">
-              <ma14:wrappingTextBoxFlag xmlns:ma14="http://schemas.microsoft.com/office/mac/drawingml/2011/main" xmlns:a14="http://schemas.microsoft.com/office/drawing/2010/main" xmlns:m="http://schemas.openxmlformats.org/officeDocument/2006/math" xmlns="" val="1"/>
+              <ma14:wrappingTextBoxFlag xmlns="" xmlns:m="http://schemas.openxmlformats.org/officeDocument/2006/math" xmlns:a14="http://schemas.microsoft.com/office/drawing/2010/main" xmlns:ma14="http://schemas.microsoft.com/office/mac/drawingml/2011/main" val="1"/>
             </a:ext>
           </a:extLst>
         </p:spPr>
@@ -11349,7 +11351,7 @@
           </a:ln>
           <a:extLst>
             <a:ext uri="{C572A759-6A51-4108-AA02-DFA0A04FC94B}">
-              <ma14:wrappingTextBoxFlag xmlns:ma14="http://schemas.microsoft.com/office/mac/drawingml/2011/main" xmlns:a14="http://schemas.microsoft.com/office/drawing/2010/main" xmlns:m="http://schemas.openxmlformats.org/officeDocument/2006/math" xmlns="" val="1"/>
+              <ma14:wrappingTextBoxFlag xmlns="" xmlns:m="http://schemas.openxmlformats.org/officeDocument/2006/math" xmlns:a14="http://schemas.microsoft.com/office/drawing/2010/main" xmlns:ma14="http://schemas.microsoft.com/office/mac/drawingml/2011/main" val="1"/>
             </a:ext>
           </a:extLst>
         </p:spPr>
@@ -11725,7 +11727,7 @@
           </a:ln>
           <a:extLst>
             <a:ext uri="{C572A759-6A51-4108-AA02-DFA0A04FC94B}">
-              <ma14:wrappingTextBoxFlag xmlns:ma14="http://schemas.microsoft.com/office/mac/drawingml/2011/main" xmlns:a14="http://schemas.microsoft.com/office/drawing/2010/main" xmlns:m="http://schemas.openxmlformats.org/officeDocument/2006/math" xmlns="" val="1"/>
+              <ma14:wrappingTextBoxFlag xmlns="" xmlns:m="http://schemas.openxmlformats.org/officeDocument/2006/math" xmlns:a14="http://schemas.microsoft.com/office/drawing/2010/main" xmlns:ma14="http://schemas.microsoft.com/office/mac/drawingml/2011/main" val="1"/>
             </a:ext>
           </a:extLst>
         </p:spPr>
@@ -11931,7 +11933,7 @@
           </a:ln>
           <a:extLst>
             <a:ext uri="{C572A759-6A51-4108-AA02-DFA0A04FC94B}">
-              <ma14:wrappingTextBoxFlag xmlns:ma14="http://schemas.microsoft.com/office/mac/drawingml/2011/main" xmlns:a14="http://schemas.microsoft.com/office/drawing/2010/main" xmlns:m="http://schemas.openxmlformats.org/officeDocument/2006/math" xmlns="" val="1"/>
+              <ma14:wrappingTextBoxFlag xmlns="" xmlns:m="http://schemas.openxmlformats.org/officeDocument/2006/math" xmlns:a14="http://schemas.microsoft.com/office/drawing/2010/main" xmlns:ma14="http://schemas.microsoft.com/office/mac/drawingml/2011/main" val="1"/>
             </a:ext>
           </a:extLst>
         </p:spPr>
@@ -12025,7 +12027,7 @@
           </a:ln>
           <a:extLst>
             <a:ext uri="{C572A759-6A51-4108-AA02-DFA0A04FC94B}">
-              <ma14:wrappingTextBoxFlag xmlns:ma14="http://schemas.microsoft.com/office/mac/drawingml/2011/main" xmlns:a14="http://schemas.microsoft.com/office/drawing/2010/main" xmlns:m="http://schemas.openxmlformats.org/officeDocument/2006/math" xmlns="" val="1"/>
+              <ma14:wrappingTextBoxFlag xmlns="" xmlns:m="http://schemas.openxmlformats.org/officeDocument/2006/math" xmlns:a14="http://schemas.microsoft.com/office/drawing/2010/main" xmlns:ma14="http://schemas.microsoft.com/office/mac/drawingml/2011/main" val="1"/>
             </a:ext>
           </a:extLst>
         </p:spPr>
@@ -12401,7 +12403,7 @@
           </a:ln>
           <a:extLst>
             <a:ext uri="{C572A759-6A51-4108-AA02-DFA0A04FC94B}">
-              <ma14:wrappingTextBoxFlag xmlns:ma14="http://schemas.microsoft.com/office/mac/drawingml/2011/main" xmlns:a14="http://schemas.microsoft.com/office/drawing/2010/main" xmlns:m="http://schemas.openxmlformats.org/officeDocument/2006/math" xmlns="" val="1"/>
+              <ma14:wrappingTextBoxFlag xmlns="" xmlns:m="http://schemas.openxmlformats.org/officeDocument/2006/math" xmlns:a14="http://schemas.microsoft.com/office/drawing/2010/main" xmlns:ma14="http://schemas.microsoft.com/office/mac/drawingml/2011/main" val="1"/>
             </a:ext>
           </a:extLst>
         </p:spPr>
@@ -12506,7 +12508,7 @@
           </a:ln>
           <a:extLst>
             <a:ext uri="{C572A759-6A51-4108-AA02-DFA0A04FC94B}">
-              <ma14:wrappingTextBoxFlag xmlns:ma14="http://schemas.microsoft.com/office/mac/drawingml/2011/main" xmlns:a14="http://schemas.microsoft.com/office/drawing/2010/main" xmlns:m="http://schemas.openxmlformats.org/officeDocument/2006/math" xmlns="" val="1"/>
+              <ma14:wrappingTextBoxFlag xmlns="" xmlns:m="http://schemas.openxmlformats.org/officeDocument/2006/math" xmlns:a14="http://schemas.microsoft.com/office/drawing/2010/main" xmlns:ma14="http://schemas.microsoft.com/office/mac/drawingml/2011/main" val="1"/>
             </a:ext>
           </a:extLst>
         </p:spPr>
@@ -12600,7 +12602,7 @@
           </a:ln>
           <a:extLst>
             <a:ext uri="{C572A759-6A51-4108-AA02-DFA0A04FC94B}">
-              <ma14:wrappingTextBoxFlag xmlns:ma14="http://schemas.microsoft.com/office/mac/drawingml/2011/main" xmlns:a14="http://schemas.microsoft.com/office/drawing/2010/main" xmlns:m="http://schemas.openxmlformats.org/officeDocument/2006/math" xmlns="" val="1"/>
+              <ma14:wrappingTextBoxFlag xmlns="" xmlns:m="http://schemas.openxmlformats.org/officeDocument/2006/math" xmlns:a14="http://schemas.microsoft.com/office/drawing/2010/main" xmlns:ma14="http://schemas.microsoft.com/office/mac/drawingml/2011/main" val="1"/>
             </a:ext>
           </a:extLst>
         </p:spPr>
@@ -12678,7 +12680,7 @@
           </a:ln>
           <a:extLst>
             <a:ext uri="{C572A759-6A51-4108-AA02-DFA0A04FC94B}">
-              <ma14:wrappingTextBoxFlag xmlns:ma14="http://schemas.microsoft.com/office/mac/drawingml/2011/main" xmlns:a14="http://schemas.microsoft.com/office/drawing/2010/main" xmlns:m="http://schemas.openxmlformats.org/officeDocument/2006/math" xmlns="" val="1"/>
+              <ma14:wrappingTextBoxFlag xmlns="" xmlns:m="http://schemas.openxmlformats.org/officeDocument/2006/math" xmlns:a14="http://schemas.microsoft.com/office/drawing/2010/main" xmlns:ma14="http://schemas.microsoft.com/office/mac/drawingml/2011/main" val="1"/>
             </a:ext>
           </a:extLst>
         </p:spPr>
@@ -13057,7 +13059,7 @@
           </a:ln>
           <a:extLst>
             <a:ext uri="{C572A759-6A51-4108-AA02-DFA0A04FC94B}">
-              <ma14:wrappingTextBoxFlag xmlns:ma14="http://schemas.microsoft.com/office/mac/drawingml/2011/main" xmlns:a14="http://schemas.microsoft.com/office/drawing/2010/main" xmlns:m="http://schemas.openxmlformats.org/officeDocument/2006/math" xmlns="" val="1"/>
+              <ma14:wrappingTextBoxFlag xmlns="" xmlns:m="http://schemas.openxmlformats.org/officeDocument/2006/math" xmlns:a14="http://schemas.microsoft.com/office/drawing/2010/main" xmlns:ma14="http://schemas.microsoft.com/office/mac/drawingml/2011/main" val="1"/>
             </a:ext>
           </a:extLst>
         </p:spPr>
@@ -13235,7 +13237,7 @@
           </a:ln>
           <a:extLst>
             <a:ext uri="{C572A759-6A51-4108-AA02-DFA0A04FC94B}">
-              <ma14:wrappingTextBoxFlag xmlns:ma14="http://schemas.microsoft.com/office/mac/drawingml/2011/main" xmlns:a14="http://schemas.microsoft.com/office/drawing/2010/main" xmlns:m="http://schemas.openxmlformats.org/officeDocument/2006/math" xmlns="" val="1"/>
+              <ma14:wrappingTextBoxFlag xmlns="" xmlns:m="http://schemas.openxmlformats.org/officeDocument/2006/math" xmlns:a14="http://schemas.microsoft.com/office/drawing/2010/main" xmlns:ma14="http://schemas.microsoft.com/office/mac/drawingml/2011/main" val="1"/>
             </a:ext>
           </a:extLst>
         </p:spPr>
@@ -13658,7 +13660,7 @@
           </a:ln>
           <a:extLst>
             <a:ext uri="{C572A759-6A51-4108-AA02-DFA0A04FC94B}">
-              <ma14:wrappingTextBoxFlag xmlns:ma14="http://schemas.microsoft.com/office/mac/drawingml/2011/main" xmlns:a14="http://schemas.microsoft.com/office/drawing/2010/main" xmlns:m="http://schemas.openxmlformats.org/officeDocument/2006/math" xmlns="" val="1"/>
+              <ma14:wrappingTextBoxFlag xmlns="" xmlns:m="http://schemas.openxmlformats.org/officeDocument/2006/math" xmlns:a14="http://schemas.microsoft.com/office/drawing/2010/main" xmlns:ma14="http://schemas.microsoft.com/office/mac/drawingml/2011/main" val="1"/>
             </a:ext>
           </a:extLst>
         </p:spPr>
@@ -13836,7 +13838,7 @@
           </a:ln>
           <a:extLst>
             <a:ext uri="{C572A759-6A51-4108-AA02-DFA0A04FC94B}">
-              <ma14:wrappingTextBoxFlag xmlns:ma14="http://schemas.microsoft.com/office/mac/drawingml/2011/main" xmlns:a14="http://schemas.microsoft.com/office/drawing/2010/main" xmlns:m="http://schemas.openxmlformats.org/officeDocument/2006/math" xmlns="" val="1"/>
+              <ma14:wrappingTextBoxFlag xmlns="" xmlns:m="http://schemas.openxmlformats.org/officeDocument/2006/math" xmlns:a14="http://schemas.microsoft.com/office/drawing/2010/main" xmlns:ma14="http://schemas.microsoft.com/office/mac/drawingml/2011/main" val="1"/>
             </a:ext>
           </a:extLst>
         </p:spPr>
@@ -14259,7 +14261,7 @@
           </a:ln>
           <a:extLst>
             <a:ext uri="{C572A759-6A51-4108-AA02-DFA0A04FC94B}">
-              <ma14:wrappingTextBoxFlag xmlns:ma14="http://schemas.microsoft.com/office/mac/drawingml/2011/main" xmlns:a14="http://schemas.microsoft.com/office/drawing/2010/main" xmlns:m="http://schemas.openxmlformats.org/officeDocument/2006/math" xmlns="" val="1"/>
+              <ma14:wrappingTextBoxFlag xmlns="" xmlns:m="http://schemas.openxmlformats.org/officeDocument/2006/math" xmlns:a14="http://schemas.microsoft.com/office/drawing/2010/main" xmlns:ma14="http://schemas.microsoft.com/office/mac/drawingml/2011/main" val="1"/>
             </a:ext>
           </a:extLst>
         </p:spPr>
@@ -14455,7 +14457,7 @@
           </a:ln>
           <a:extLst>
             <a:ext uri="{C572A759-6A51-4108-AA02-DFA0A04FC94B}">
-              <ma14:wrappingTextBoxFlag xmlns:ma14="http://schemas.microsoft.com/office/mac/drawingml/2011/main" xmlns:a14="http://schemas.microsoft.com/office/drawing/2010/main" xmlns:m="http://schemas.openxmlformats.org/officeDocument/2006/math" xmlns="" val="1"/>
+              <ma14:wrappingTextBoxFlag xmlns="" xmlns:m="http://schemas.openxmlformats.org/officeDocument/2006/math" xmlns:a14="http://schemas.microsoft.com/office/drawing/2010/main" xmlns:ma14="http://schemas.microsoft.com/office/mac/drawingml/2011/main" val="1"/>
             </a:ext>
           </a:extLst>
         </p:spPr>
@@ -14878,7 +14880,7 @@
           </a:ln>
           <a:extLst>
             <a:ext uri="{C572A759-6A51-4108-AA02-DFA0A04FC94B}">
-              <ma14:wrappingTextBoxFlag xmlns:ma14="http://schemas.microsoft.com/office/mac/drawingml/2011/main" xmlns:a14="http://schemas.microsoft.com/office/drawing/2010/main" xmlns:m="http://schemas.openxmlformats.org/officeDocument/2006/math" xmlns="" val="1"/>
+              <ma14:wrappingTextBoxFlag xmlns="" xmlns:m="http://schemas.openxmlformats.org/officeDocument/2006/math" xmlns:a14="http://schemas.microsoft.com/office/drawing/2010/main" xmlns:ma14="http://schemas.microsoft.com/office/mac/drawingml/2011/main" val="1"/>
             </a:ext>
           </a:extLst>
         </p:spPr>
@@ -15074,7 +15076,7 @@
           </a:ln>
           <a:extLst>
             <a:ext uri="{C572A759-6A51-4108-AA02-DFA0A04FC94B}">
-              <ma14:wrappingTextBoxFlag xmlns:ma14="http://schemas.microsoft.com/office/mac/drawingml/2011/main" xmlns:a14="http://schemas.microsoft.com/office/drawing/2010/main" xmlns:m="http://schemas.openxmlformats.org/officeDocument/2006/math" xmlns="" val="1"/>
+              <ma14:wrappingTextBoxFlag xmlns="" xmlns:m="http://schemas.openxmlformats.org/officeDocument/2006/math" xmlns:a14="http://schemas.microsoft.com/office/drawing/2010/main" xmlns:ma14="http://schemas.microsoft.com/office/mac/drawingml/2011/main" val="1"/>
             </a:ext>
           </a:extLst>
         </p:spPr>
@@ -15201,7 +15203,7 @@
           </a:ln>
           <a:extLst>
             <a:ext uri="{C572A759-6A51-4108-AA02-DFA0A04FC94B}">
-              <ma14:wrappingTextBoxFlag xmlns:ma14="http://schemas.microsoft.com/office/mac/drawingml/2011/main" xmlns:a14="http://schemas.microsoft.com/office/drawing/2010/main" xmlns:m="http://schemas.openxmlformats.org/officeDocument/2006/math" xmlns="" val="1"/>
+              <ma14:wrappingTextBoxFlag xmlns="" xmlns:m="http://schemas.openxmlformats.org/officeDocument/2006/math" xmlns:a14="http://schemas.microsoft.com/office/drawing/2010/main" xmlns:ma14="http://schemas.microsoft.com/office/mac/drawingml/2011/main" val="1"/>
             </a:ext>
           </a:extLst>
         </p:spPr>
@@ -15689,7 +15691,7 @@
           </a:ln>
           <a:extLst>
             <a:ext uri="{C572A759-6A51-4108-AA02-DFA0A04FC94B}">
-              <ma14:wrappingTextBoxFlag xmlns:ma14="http://schemas.microsoft.com/office/mac/drawingml/2011/main" xmlns:a14="http://schemas.microsoft.com/office/drawing/2010/main" xmlns:m="http://schemas.openxmlformats.org/officeDocument/2006/math" xmlns="" val="1"/>
+              <ma14:wrappingTextBoxFlag xmlns="" xmlns:m="http://schemas.openxmlformats.org/officeDocument/2006/math" xmlns:a14="http://schemas.microsoft.com/office/drawing/2010/main" xmlns:ma14="http://schemas.microsoft.com/office/mac/drawingml/2011/main" val="1"/>
             </a:ext>
           </a:extLst>
         </p:spPr>
@@ -16129,7 +16131,7 @@
           </a:ln>
           <a:extLst>
             <a:ext uri="{C572A759-6A51-4108-AA02-DFA0A04FC94B}">
-              <ma14:wrappingTextBoxFlag xmlns:ma14="http://schemas.microsoft.com/office/mac/drawingml/2011/main" xmlns:a14="http://schemas.microsoft.com/office/drawing/2010/main" xmlns:m="http://schemas.openxmlformats.org/officeDocument/2006/math" xmlns="" val="1"/>
+              <ma14:wrappingTextBoxFlag xmlns="" xmlns:m="http://schemas.openxmlformats.org/officeDocument/2006/math" xmlns:a14="http://schemas.microsoft.com/office/drawing/2010/main" xmlns:ma14="http://schemas.microsoft.com/office/mac/drawingml/2011/main" val="1"/>
             </a:ext>
           </a:extLst>
         </p:spPr>
@@ -16525,7 +16527,7 @@
           </a:ln>
           <a:extLst>
             <a:ext uri="{C572A759-6A51-4108-AA02-DFA0A04FC94B}">
-              <ma14:wrappingTextBoxFlag xmlns:ma14="http://schemas.microsoft.com/office/mac/drawingml/2011/main" xmlns:a14="http://schemas.microsoft.com/office/drawing/2010/main" xmlns:m="http://schemas.openxmlformats.org/officeDocument/2006/math" xmlns="" val="1"/>
+              <ma14:wrappingTextBoxFlag xmlns="" xmlns:m="http://schemas.openxmlformats.org/officeDocument/2006/math" xmlns:a14="http://schemas.microsoft.com/office/drawing/2010/main" xmlns:ma14="http://schemas.microsoft.com/office/mac/drawingml/2011/main" val="1"/>
             </a:ext>
           </a:extLst>
         </p:spPr>
@@ -16817,7 +16819,7 @@
           </a:ln>
           <a:extLst>
             <a:ext uri="{C572A759-6A51-4108-AA02-DFA0A04FC94B}">
-              <ma14:wrappingTextBoxFlag xmlns:ma14="http://schemas.microsoft.com/office/mac/drawingml/2011/main" xmlns:a14="http://schemas.microsoft.com/office/drawing/2010/main" xmlns:m="http://schemas.openxmlformats.org/officeDocument/2006/math" xmlns="" val="1"/>
+              <ma14:wrappingTextBoxFlag xmlns="" xmlns:m="http://schemas.openxmlformats.org/officeDocument/2006/math" xmlns:a14="http://schemas.microsoft.com/office/drawing/2010/main" xmlns:ma14="http://schemas.microsoft.com/office/mac/drawingml/2011/main" val="1"/>
             </a:ext>
           </a:extLst>
         </p:spPr>
@@ -17082,7 +17084,7 @@
           </a:ln>
           <a:extLst>
             <a:ext uri="{C572A759-6A51-4108-AA02-DFA0A04FC94B}">
-              <ma14:wrappingTextBoxFlag xmlns:ma14="http://schemas.microsoft.com/office/mac/drawingml/2011/main" xmlns:a14="http://schemas.microsoft.com/office/drawing/2010/main" xmlns:m="http://schemas.openxmlformats.org/officeDocument/2006/math" xmlns="" val="1"/>
+              <ma14:wrappingTextBoxFlag xmlns="" xmlns:m="http://schemas.openxmlformats.org/officeDocument/2006/math" xmlns:a14="http://schemas.microsoft.com/office/drawing/2010/main" xmlns:ma14="http://schemas.microsoft.com/office/mac/drawingml/2011/main" val="1"/>
             </a:ext>
           </a:extLst>
         </p:spPr>
@@ -17360,7 +17362,7 @@
           </a:ln>
           <a:extLst>
             <a:ext uri="{C572A759-6A51-4108-AA02-DFA0A04FC94B}">
-              <ma14:wrappingTextBoxFlag xmlns:ma14="http://schemas.microsoft.com/office/mac/drawingml/2011/main" xmlns:a14="http://schemas.microsoft.com/office/drawing/2010/main" xmlns:m="http://schemas.openxmlformats.org/officeDocument/2006/math" xmlns="" val="1"/>
+              <ma14:wrappingTextBoxFlag xmlns="" xmlns:m="http://schemas.openxmlformats.org/officeDocument/2006/math" xmlns:a14="http://schemas.microsoft.com/office/drawing/2010/main" xmlns:ma14="http://schemas.microsoft.com/office/mac/drawingml/2011/main" val="1"/>
             </a:ext>
           </a:extLst>
         </p:spPr>
@@ -17638,7 +17640,7 @@
           </a:ln>
           <a:extLst>
             <a:ext uri="{C572A759-6A51-4108-AA02-DFA0A04FC94B}">
-              <ma14:wrappingTextBoxFlag xmlns:ma14="http://schemas.microsoft.com/office/mac/drawingml/2011/main" xmlns:a14="http://schemas.microsoft.com/office/drawing/2010/main" xmlns:m="http://schemas.openxmlformats.org/officeDocument/2006/math" xmlns="" val="1"/>
+              <ma14:wrappingTextBoxFlag xmlns="" xmlns:m="http://schemas.openxmlformats.org/officeDocument/2006/math" xmlns:a14="http://schemas.microsoft.com/office/drawing/2010/main" xmlns:ma14="http://schemas.microsoft.com/office/mac/drawingml/2011/main" val="1"/>
             </a:ext>
           </a:extLst>
         </p:spPr>
@@ -17916,7 +17918,7 @@
           </a:ln>
           <a:extLst>
             <a:ext uri="{C572A759-6A51-4108-AA02-DFA0A04FC94B}">
-              <ma14:wrappingTextBoxFlag xmlns:ma14="http://schemas.microsoft.com/office/mac/drawingml/2011/main" xmlns:a14="http://schemas.microsoft.com/office/drawing/2010/main" xmlns:m="http://schemas.openxmlformats.org/officeDocument/2006/math" xmlns="" val="1"/>
+              <ma14:wrappingTextBoxFlag xmlns="" xmlns:m="http://schemas.openxmlformats.org/officeDocument/2006/math" xmlns:a14="http://schemas.microsoft.com/office/drawing/2010/main" xmlns:ma14="http://schemas.microsoft.com/office/mac/drawingml/2011/main" val="1"/>
             </a:ext>
           </a:extLst>
         </p:spPr>
@@ -18194,7 +18196,7 @@
           </a:ln>
           <a:extLst>
             <a:ext uri="{C572A759-6A51-4108-AA02-DFA0A04FC94B}">
-              <ma14:wrappingTextBoxFlag xmlns:ma14="http://schemas.microsoft.com/office/mac/drawingml/2011/main" xmlns:a14="http://schemas.microsoft.com/office/drawing/2010/main" xmlns:m="http://schemas.openxmlformats.org/officeDocument/2006/math" xmlns="" val="1"/>
+              <ma14:wrappingTextBoxFlag xmlns="" xmlns:m="http://schemas.openxmlformats.org/officeDocument/2006/math" xmlns:a14="http://schemas.microsoft.com/office/drawing/2010/main" xmlns:ma14="http://schemas.microsoft.com/office/mac/drawingml/2011/main" val="1"/>
             </a:ext>
           </a:extLst>
         </p:spPr>
@@ -18472,7 +18474,7 @@
           </a:ln>
           <a:extLst>
             <a:ext uri="{C572A759-6A51-4108-AA02-DFA0A04FC94B}">
-              <ma14:wrappingTextBoxFlag xmlns:ma14="http://schemas.microsoft.com/office/mac/drawingml/2011/main" xmlns:a14="http://schemas.microsoft.com/office/drawing/2010/main" xmlns:m="http://schemas.openxmlformats.org/officeDocument/2006/math" xmlns="" val="1"/>
+              <ma14:wrappingTextBoxFlag xmlns="" xmlns:m="http://schemas.openxmlformats.org/officeDocument/2006/math" xmlns:a14="http://schemas.microsoft.com/office/drawing/2010/main" xmlns:ma14="http://schemas.microsoft.com/office/mac/drawingml/2011/main" val="1"/>
             </a:ext>
           </a:extLst>
         </p:spPr>
@@ -18751,7 +18753,7 @@
           </a:ln>
           <a:extLst>
             <a:ext uri="{C572A759-6A51-4108-AA02-DFA0A04FC94B}">
-              <ma14:wrappingTextBoxFlag xmlns:ma14="http://schemas.microsoft.com/office/mac/drawingml/2011/main" xmlns:a14="http://schemas.microsoft.com/office/drawing/2010/main" xmlns:m="http://schemas.openxmlformats.org/officeDocument/2006/math" xmlns="" val="1"/>
+              <ma14:wrappingTextBoxFlag xmlns="" xmlns:m="http://schemas.openxmlformats.org/officeDocument/2006/math" xmlns:a14="http://schemas.microsoft.com/office/drawing/2010/main" xmlns:ma14="http://schemas.microsoft.com/office/mac/drawingml/2011/main" val="1"/>
             </a:ext>
           </a:extLst>
         </p:spPr>
@@ -18835,7 +18837,7 @@
           </a:ln>
           <a:extLst>
             <a:ext uri="{C572A759-6A51-4108-AA02-DFA0A04FC94B}">
-              <ma14:wrappingTextBoxFlag xmlns:ma14="http://schemas.microsoft.com/office/mac/drawingml/2011/main" xmlns:a14="http://schemas.microsoft.com/office/drawing/2010/main" xmlns:m="http://schemas.openxmlformats.org/officeDocument/2006/math" xmlns="" val="1"/>
+              <ma14:wrappingTextBoxFlag xmlns="" xmlns:m="http://schemas.openxmlformats.org/officeDocument/2006/math" xmlns:a14="http://schemas.microsoft.com/office/drawing/2010/main" xmlns:ma14="http://schemas.microsoft.com/office/mac/drawingml/2011/main" val="1"/>
             </a:ext>
           </a:extLst>
         </p:spPr>
@@ -19278,7 +19280,7 @@
           </a:ln>
           <a:extLst>
             <a:ext uri="{C572A759-6A51-4108-AA02-DFA0A04FC94B}">
-              <ma14:wrappingTextBoxFlag xmlns:ma14="http://schemas.microsoft.com/office/mac/drawingml/2011/main" xmlns:a14="http://schemas.microsoft.com/office/drawing/2010/main" xmlns:m="http://schemas.openxmlformats.org/officeDocument/2006/math" xmlns="" val="1"/>
+              <ma14:wrappingTextBoxFlag xmlns="" xmlns:m="http://schemas.openxmlformats.org/officeDocument/2006/math" xmlns:a14="http://schemas.microsoft.com/office/drawing/2010/main" xmlns:ma14="http://schemas.microsoft.com/office/mac/drawingml/2011/main" val="1"/>
             </a:ext>
           </a:extLst>
         </p:spPr>
@@ -19362,7 +19364,7 @@
           </a:ln>
           <a:extLst>
             <a:ext uri="{C572A759-6A51-4108-AA02-DFA0A04FC94B}">
-              <ma14:wrappingTextBoxFlag xmlns:ma14="http://schemas.microsoft.com/office/mac/drawingml/2011/main" xmlns:a14="http://schemas.microsoft.com/office/drawing/2010/main" xmlns:m="http://schemas.openxmlformats.org/officeDocument/2006/math" xmlns="" val="1"/>
+              <ma14:wrappingTextBoxFlag xmlns="" xmlns:m="http://schemas.openxmlformats.org/officeDocument/2006/math" xmlns:a14="http://schemas.microsoft.com/office/drawing/2010/main" xmlns:ma14="http://schemas.microsoft.com/office/mac/drawingml/2011/main" val="1"/>
             </a:ext>
           </a:extLst>
         </p:spPr>
@@ -19479,7 +19481,7 @@
           </a:ln>
           <a:extLst>
             <a:ext uri="{C572A759-6A51-4108-AA02-DFA0A04FC94B}">
-              <ma14:wrappingTextBoxFlag xmlns:ma14="http://schemas.microsoft.com/office/mac/drawingml/2011/main" xmlns:a14="http://schemas.microsoft.com/office/drawing/2010/main" xmlns:m="http://schemas.openxmlformats.org/officeDocument/2006/math" xmlns="" val="1"/>
+              <ma14:wrappingTextBoxFlag xmlns="" xmlns:m="http://schemas.openxmlformats.org/officeDocument/2006/math" xmlns:a14="http://schemas.microsoft.com/office/drawing/2010/main" xmlns:ma14="http://schemas.microsoft.com/office/mac/drawingml/2011/main" val="1"/>
             </a:ext>
           </a:extLst>
         </p:spPr>
@@ -19548,7 +19550,7 @@
           </a:ln>
           <a:extLst>
             <a:ext uri="{C572A759-6A51-4108-AA02-DFA0A04FC94B}">
-              <ma14:wrappingTextBoxFlag xmlns:ma14="http://schemas.microsoft.com/office/mac/drawingml/2011/main" xmlns:a14="http://schemas.microsoft.com/office/drawing/2010/main" xmlns:m="http://schemas.openxmlformats.org/officeDocument/2006/math" xmlns="" val="1"/>
+              <ma14:wrappingTextBoxFlag xmlns="" xmlns:m="http://schemas.openxmlformats.org/officeDocument/2006/math" xmlns:a14="http://schemas.microsoft.com/office/drawing/2010/main" xmlns:ma14="http://schemas.microsoft.com/office/mac/drawingml/2011/main" val="1"/>
             </a:ext>
           </a:extLst>
         </p:spPr>
@@ -19652,7 +19654,7 @@
           </a:ln>
           <a:extLst>
             <a:ext uri="{C572A759-6A51-4108-AA02-DFA0A04FC94B}">
-              <ma14:wrappingTextBoxFlag xmlns:ma14="http://schemas.microsoft.com/office/mac/drawingml/2011/main" xmlns:a14="http://schemas.microsoft.com/office/drawing/2010/main" xmlns:m="http://schemas.openxmlformats.org/officeDocument/2006/math" xmlns="" val="1"/>
+              <ma14:wrappingTextBoxFlag xmlns="" xmlns:m="http://schemas.openxmlformats.org/officeDocument/2006/math" xmlns:a14="http://schemas.microsoft.com/office/drawing/2010/main" xmlns:ma14="http://schemas.microsoft.com/office/mac/drawingml/2011/main" val="1"/>
             </a:ext>
           </a:extLst>
         </p:spPr>
@@ -19946,7 +19948,7 @@
           </a:ln>
           <a:extLst>
             <a:ext uri="{C572A759-6A51-4108-AA02-DFA0A04FC94B}">
-              <ma14:wrappingTextBoxFlag xmlns:ma14="http://schemas.microsoft.com/office/mac/drawingml/2011/main" xmlns:a14="http://schemas.microsoft.com/office/drawing/2010/main" xmlns:m="http://schemas.openxmlformats.org/officeDocument/2006/math" xmlns="" val="1"/>
+              <ma14:wrappingTextBoxFlag xmlns="" xmlns:m="http://schemas.openxmlformats.org/officeDocument/2006/math" xmlns:a14="http://schemas.microsoft.com/office/drawing/2010/main" xmlns:ma14="http://schemas.microsoft.com/office/mac/drawingml/2011/main" val="1"/>
             </a:ext>
           </a:extLst>
         </p:spPr>
@@ -20000,7 +20002,7 @@
           </a:ln>
           <a:extLst>
             <a:ext uri="{C572A759-6A51-4108-AA02-DFA0A04FC94B}">
-              <ma14:wrappingTextBoxFlag xmlns:ma14="http://schemas.microsoft.com/office/mac/drawingml/2011/main" xmlns:a14="http://schemas.microsoft.com/office/drawing/2010/main" xmlns:m="http://schemas.openxmlformats.org/officeDocument/2006/math" xmlns="" val="1"/>
+              <ma14:wrappingTextBoxFlag xmlns="" xmlns:m="http://schemas.openxmlformats.org/officeDocument/2006/math" xmlns:a14="http://schemas.microsoft.com/office/drawing/2010/main" xmlns:ma14="http://schemas.microsoft.com/office/mac/drawingml/2011/main" val="1"/>
             </a:ext>
           </a:extLst>
         </p:spPr>
@@ -20086,7 +20088,7 @@
           </a:ln>
           <a:extLst>
             <a:ext uri="{C572A759-6A51-4108-AA02-DFA0A04FC94B}">
-              <ma14:wrappingTextBoxFlag xmlns:ma14="http://schemas.microsoft.com/office/mac/drawingml/2011/main" xmlns:a14="http://schemas.microsoft.com/office/drawing/2010/main" xmlns:m="http://schemas.openxmlformats.org/officeDocument/2006/math" xmlns="" val="1"/>
+              <ma14:wrappingTextBoxFlag xmlns="" xmlns:m="http://schemas.openxmlformats.org/officeDocument/2006/math" xmlns:a14="http://schemas.microsoft.com/office/drawing/2010/main" xmlns:ma14="http://schemas.microsoft.com/office/mac/drawingml/2011/main" val="1"/>
             </a:ext>
           </a:extLst>
         </p:spPr>
@@ -20164,7 +20166,7 @@
           </a:ln>
           <a:extLst>
             <a:ext uri="{C572A759-6A51-4108-AA02-DFA0A04FC94B}">
-              <ma14:wrappingTextBoxFlag xmlns:ma14="http://schemas.microsoft.com/office/mac/drawingml/2011/main" xmlns:a14="http://schemas.microsoft.com/office/drawing/2010/main" xmlns:m="http://schemas.openxmlformats.org/officeDocument/2006/math" xmlns="" val="1"/>
+              <ma14:wrappingTextBoxFlag xmlns="" xmlns:m="http://schemas.openxmlformats.org/officeDocument/2006/math" xmlns:a14="http://schemas.microsoft.com/office/drawing/2010/main" xmlns:ma14="http://schemas.microsoft.com/office/mac/drawingml/2011/main" val="1"/>
             </a:ext>
           </a:extLst>
         </p:spPr>
@@ -20203,7 +20205,7 @@
           </a:ln>
           <a:extLst>
             <a:ext uri="{C572A759-6A51-4108-AA02-DFA0A04FC94B}">
-              <ma14:wrappingTextBoxFlag xmlns:ma14="http://schemas.microsoft.com/office/mac/drawingml/2011/main" xmlns:a14="http://schemas.microsoft.com/office/drawing/2010/main" xmlns:m="http://schemas.openxmlformats.org/officeDocument/2006/math" xmlns="" val="1"/>
+              <ma14:wrappingTextBoxFlag xmlns="" xmlns:m="http://schemas.openxmlformats.org/officeDocument/2006/math" xmlns:a14="http://schemas.microsoft.com/office/drawing/2010/main" xmlns:ma14="http://schemas.microsoft.com/office/mac/drawingml/2011/main" val="1"/>
             </a:ext>
           </a:extLst>
         </p:spPr>
@@ -21045,7 +21047,7 @@
           </a:ln>
           <a:extLst>
             <a:ext uri="{C572A759-6A51-4108-AA02-DFA0A04FC94B}">
-              <ma14:wrappingTextBoxFlag xmlns:ma14="http://schemas.microsoft.com/office/mac/drawingml/2011/main" xmlns:a14="http://schemas.microsoft.com/office/drawing/2010/main" xmlns:m="http://schemas.openxmlformats.org/officeDocument/2006/math" xmlns="" val="1"/>
+              <ma14:wrappingTextBoxFlag xmlns="" xmlns:m="http://schemas.openxmlformats.org/officeDocument/2006/math" xmlns:a14="http://schemas.microsoft.com/office/drawing/2010/main" xmlns:ma14="http://schemas.microsoft.com/office/mac/drawingml/2011/main" val="1"/>
             </a:ext>
           </a:extLst>
         </p:spPr>
@@ -21534,7 +21536,7 @@
           </a:ln>
           <a:extLst>
             <a:ext uri="{C572A759-6A51-4108-AA02-DFA0A04FC94B}">
-              <ma14:wrappingTextBoxFlag xmlns:ma14="http://schemas.microsoft.com/office/mac/drawingml/2011/main" xmlns:a14="http://schemas.microsoft.com/office/drawing/2010/main" xmlns:m="http://schemas.openxmlformats.org/officeDocument/2006/math" xmlns="" val="1"/>
+              <ma14:wrappingTextBoxFlag xmlns="" xmlns:m="http://schemas.openxmlformats.org/officeDocument/2006/math" xmlns:a14="http://schemas.microsoft.com/office/drawing/2010/main" xmlns:ma14="http://schemas.microsoft.com/office/mac/drawingml/2011/main" val="1"/>
             </a:ext>
           </a:extLst>
         </p:spPr>
@@ -21865,7 +21867,7 @@
           </a:ln>
           <a:extLst>
             <a:ext uri="{C572A759-6A51-4108-AA02-DFA0A04FC94B}">
-              <ma14:wrappingTextBoxFlag xmlns:ma14="http://schemas.microsoft.com/office/mac/drawingml/2011/main" xmlns:a14="http://schemas.microsoft.com/office/drawing/2010/main" xmlns:m="http://schemas.openxmlformats.org/officeDocument/2006/math" xmlns="" val="1"/>
+              <ma14:wrappingTextBoxFlag xmlns="" xmlns:m="http://schemas.openxmlformats.org/officeDocument/2006/math" xmlns:a14="http://schemas.microsoft.com/office/drawing/2010/main" xmlns:ma14="http://schemas.microsoft.com/office/mac/drawingml/2011/main" val="1"/>
             </a:ext>
           </a:extLst>
         </p:spPr>
@@ -22086,7 +22088,7 @@
           </a:ln>
           <a:extLst>
             <a:ext uri="{C572A759-6A51-4108-AA02-DFA0A04FC94B}">
-              <ma14:wrappingTextBoxFlag xmlns:ma14="http://schemas.microsoft.com/office/mac/drawingml/2011/main" xmlns:a14="http://schemas.microsoft.com/office/drawing/2010/main" xmlns:m="http://schemas.openxmlformats.org/officeDocument/2006/math" xmlns="" val="1"/>
+              <ma14:wrappingTextBoxFlag xmlns="" xmlns:m="http://schemas.openxmlformats.org/officeDocument/2006/math" xmlns:a14="http://schemas.microsoft.com/office/drawing/2010/main" xmlns:ma14="http://schemas.microsoft.com/office/mac/drawingml/2011/main" val="1"/>
             </a:ext>
           </a:extLst>
         </p:spPr>
@@ -22417,7 +22419,7 @@
           </a:ln>
           <a:extLst>
             <a:ext uri="{C572A759-6A51-4108-AA02-DFA0A04FC94B}">
-              <ma14:wrappingTextBoxFlag xmlns:ma14="http://schemas.microsoft.com/office/mac/drawingml/2011/main" xmlns:a14="http://schemas.microsoft.com/office/drawing/2010/main" xmlns:m="http://schemas.openxmlformats.org/officeDocument/2006/math" xmlns="" val="1"/>
+              <ma14:wrappingTextBoxFlag xmlns="" xmlns:m="http://schemas.openxmlformats.org/officeDocument/2006/math" xmlns:a14="http://schemas.microsoft.com/office/drawing/2010/main" xmlns:ma14="http://schemas.microsoft.com/office/mac/drawingml/2011/main" val="1"/>
             </a:ext>
           </a:extLst>
         </p:spPr>
@@ -22483,7 +22485,7 @@
           </a:ln>
           <a:extLst>
             <a:ext uri="{C572A759-6A51-4108-AA02-DFA0A04FC94B}">
-              <ma14:wrappingTextBoxFlag xmlns:ma14="http://schemas.microsoft.com/office/mac/drawingml/2011/main" xmlns:a14="http://schemas.microsoft.com/office/drawing/2010/main" xmlns:m="http://schemas.openxmlformats.org/officeDocument/2006/math" xmlns="" val="1"/>
+              <ma14:wrappingTextBoxFlag xmlns="" xmlns:m="http://schemas.openxmlformats.org/officeDocument/2006/math" xmlns:a14="http://schemas.microsoft.com/office/drawing/2010/main" xmlns:ma14="http://schemas.microsoft.com/office/mac/drawingml/2011/main" val="1"/>
             </a:ext>
           </a:extLst>
         </p:spPr>
@@ -22782,7 +22784,7 @@
           </a:ln>
           <a:extLst>
             <a:ext uri="{C572A759-6A51-4108-AA02-DFA0A04FC94B}">
-              <ma14:wrappingTextBoxFlag xmlns:ma14="http://schemas.microsoft.com/office/mac/drawingml/2011/main" xmlns:a14="http://schemas.microsoft.com/office/drawing/2010/main" xmlns:m="http://schemas.openxmlformats.org/officeDocument/2006/math" xmlns="" val="1"/>
+              <ma14:wrappingTextBoxFlag xmlns="" xmlns:m="http://schemas.openxmlformats.org/officeDocument/2006/math" xmlns:a14="http://schemas.microsoft.com/office/drawing/2010/main" xmlns:ma14="http://schemas.microsoft.com/office/mac/drawingml/2011/main" val="1"/>
             </a:ext>
           </a:extLst>
         </p:spPr>
@@ -23209,7 +23211,7 @@
           </a:ln>
           <a:extLst>
             <a:ext uri="{C572A759-6A51-4108-AA02-DFA0A04FC94B}">
-              <ma14:wrappingTextBoxFlag xmlns:ma14="http://schemas.microsoft.com/office/mac/drawingml/2011/main" xmlns:a14="http://schemas.microsoft.com/office/drawing/2010/main" xmlns:m="http://schemas.openxmlformats.org/officeDocument/2006/math" xmlns="" val="1"/>
+              <ma14:wrappingTextBoxFlag xmlns="" xmlns:m="http://schemas.openxmlformats.org/officeDocument/2006/math" xmlns:a14="http://schemas.microsoft.com/office/drawing/2010/main" xmlns:ma14="http://schemas.microsoft.com/office/mac/drawingml/2011/main" val="1"/>
             </a:ext>
           </a:extLst>
         </p:spPr>
@@ -23486,7 +23488,7 @@
           </a:ln>
           <a:extLst>
             <a:ext uri="{C572A759-6A51-4108-AA02-DFA0A04FC94B}">
-              <ma14:wrappingTextBoxFlag xmlns:ma14="http://schemas.microsoft.com/office/mac/drawingml/2011/main" xmlns:a14="http://schemas.microsoft.com/office/drawing/2010/main" xmlns:m="http://schemas.openxmlformats.org/officeDocument/2006/math" xmlns="" val="1"/>
+              <ma14:wrappingTextBoxFlag xmlns="" xmlns:m="http://schemas.openxmlformats.org/officeDocument/2006/math" xmlns:a14="http://schemas.microsoft.com/office/drawing/2010/main" xmlns:ma14="http://schemas.microsoft.com/office/mac/drawingml/2011/main" val="1"/>
             </a:ext>
           </a:extLst>
         </p:spPr>
@@ -23548,7 +23550,7 @@
           </a:ln>
           <a:extLst>
             <a:ext uri="{C572A759-6A51-4108-AA02-DFA0A04FC94B}">
-              <ma14:wrappingTextBoxFlag xmlns:ma14="http://schemas.microsoft.com/office/mac/drawingml/2011/main" xmlns:a14="http://schemas.microsoft.com/office/drawing/2010/main" xmlns:m="http://schemas.openxmlformats.org/officeDocument/2006/math" xmlns="" val="1"/>
+              <ma14:wrappingTextBoxFlag xmlns="" xmlns:m="http://schemas.openxmlformats.org/officeDocument/2006/math" xmlns:a14="http://schemas.microsoft.com/office/drawing/2010/main" xmlns:ma14="http://schemas.microsoft.com/office/mac/drawingml/2011/main" val="1"/>
             </a:ext>
           </a:extLst>
         </p:spPr>
@@ -23760,7 +23762,7 @@
           </a:ln>
           <a:extLst>
             <a:ext uri="{C572A759-6A51-4108-AA02-DFA0A04FC94B}">
-              <ma14:wrappingTextBoxFlag xmlns:ma14="http://schemas.microsoft.com/office/mac/drawingml/2011/main" xmlns:a14="http://schemas.microsoft.com/office/drawing/2010/main" xmlns:m="http://schemas.openxmlformats.org/officeDocument/2006/math" xmlns="" val="1"/>
+              <ma14:wrappingTextBoxFlag xmlns="" xmlns:m="http://schemas.openxmlformats.org/officeDocument/2006/math" xmlns:a14="http://schemas.microsoft.com/office/drawing/2010/main" xmlns:ma14="http://schemas.microsoft.com/office/mac/drawingml/2011/main" val="1"/>
             </a:ext>
           </a:extLst>
         </p:spPr>
@@ -23972,7 +23974,7 @@
           </a:ln>
           <a:extLst>
             <a:ext uri="{C572A759-6A51-4108-AA02-DFA0A04FC94B}">
-              <ma14:wrappingTextBoxFlag xmlns:ma14="http://schemas.microsoft.com/office/mac/drawingml/2011/main" xmlns:a14="http://schemas.microsoft.com/office/drawing/2010/main" xmlns:m="http://schemas.openxmlformats.org/officeDocument/2006/math" xmlns="" val="1"/>
+              <ma14:wrappingTextBoxFlag xmlns="" xmlns:m="http://schemas.openxmlformats.org/officeDocument/2006/math" xmlns:a14="http://schemas.microsoft.com/office/drawing/2010/main" xmlns:ma14="http://schemas.microsoft.com/office/mac/drawingml/2011/main" val="1"/>
             </a:ext>
           </a:extLst>
         </p:spPr>
@@ -24208,7 +24210,7 @@
           </a:ln>
           <a:extLst>
             <a:ext uri="{C572A759-6A51-4108-AA02-DFA0A04FC94B}">
-              <ma14:wrappingTextBoxFlag xmlns:ma14="http://schemas.microsoft.com/office/mac/drawingml/2011/main" xmlns:a14="http://schemas.microsoft.com/office/drawing/2010/main" xmlns:m="http://schemas.openxmlformats.org/officeDocument/2006/math" xmlns="" val="1"/>
+              <ma14:wrappingTextBoxFlag xmlns="" xmlns:m="http://schemas.openxmlformats.org/officeDocument/2006/math" xmlns:a14="http://schemas.microsoft.com/office/drawing/2010/main" xmlns:ma14="http://schemas.microsoft.com/office/mac/drawingml/2011/main" val="1"/>
             </a:ext>
           </a:extLst>
         </p:spPr>
@@ -24511,7 +24513,7 @@
           </a:ln>
           <a:extLst>
             <a:ext uri="{C572A759-6A51-4108-AA02-DFA0A04FC94B}">
-              <ma14:wrappingTextBoxFlag xmlns:ma14="http://schemas.microsoft.com/office/mac/drawingml/2011/main" xmlns:a14="http://schemas.microsoft.com/office/drawing/2010/main" xmlns:m="http://schemas.openxmlformats.org/officeDocument/2006/math" xmlns="" val="1"/>
+              <ma14:wrappingTextBoxFlag xmlns="" xmlns:m="http://schemas.openxmlformats.org/officeDocument/2006/math" xmlns:a14="http://schemas.microsoft.com/office/drawing/2010/main" xmlns:ma14="http://schemas.microsoft.com/office/mac/drawingml/2011/main" val="1"/>
             </a:ext>
           </a:extLst>
         </p:spPr>
@@ -24546,7 +24548,7 @@
           </a:ln>
           <a:extLst>
             <a:ext uri="{C572A759-6A51-4108-AA02-DFA0A04FC94B}">
-              <ma14:wrappingTextBoxFlag xmlns:ma14="http://schemas.microsoft.com/office/mac/drawingml/2011/main" xmlns:a14="http://schemas.microsoft.com/office/drawing/2010/main" xmlns:m="http://schemas.openxmlformats.org/officeDocument/2006/math" xmlns="" val="1"/>
+              <ma14:wrappingTextBoxFlag xmlns="" xmlns:m="http://schemas.openxmlformats.org/officeDocument/2006/math" xmlns:a14="http://schemas.microsoft.com/office/drawing/2010/main" xmlns:ma14="http://schemas.microsoft.com/office/mac/drawingml/2011/main" val="1"/>
             </a:ext>
           </a:extLst>
         </p:spPr>
@@ -24581,7 +24583,7 @@
           </a:ln>
           <a:extLst>
             <a:ext uri="{C572A759-6A51-4108-AA02-DFA0A04FC94B}">
-              <ma14:wrappingTextBoxFlag xmlns:ma14="http://schemas.microsoft.com/office/mac/drawingml/2011/main" xmlns:a14="http://schemas.microsoft.com/office/drawing/2010/main" xmlns:m="http://schemas.openxmlformats.org/officeDocument/2006/math" xmlns="" val="1"/>
+              <ma14:wrappingTextBoxFlag xmlns="" xmlns:m="http://schemas.openxmlformats.org/officeDocument/2006/math" xmlns:a14="http://schemas.microsoft.com/office/drawing/2010/main" xmlns:ma14="http://schemas.microsoft.com/office/mac/drawingml/2011/main" val="1"/>
             </a:ext>
           </a:extLst>
         </p:spPr>
@@ -24631,7 +24633,7 @@
           </a:ln>
           <a:extLst>
             <a:ext uri="{C572A759-6A51-4108-AA02-DFA0A04FC94B}">
-              <ma14:wrappingTextBoxFlag xmlns:ma14="http://schemas.microsoft.com/office/mac/drawingml/2011/main" xmlns:a14="http://schemas.microsoft.com/office/drawing/2010/main" xmlns:m="http://schemas.openxmlformats.org/officeDocument/2006/math" xmlns="" val="1"/>
+              <ma14:wrappingTextBoxFlag xmlns="" xmlns:m="http://schemas.openxmlformats.org/officeDocument/2006/math" xmlns:a14="http://schemas.microsoft.com/office/drawing/2010/main" xmlns:ma14="http://schemas.microsoft.com/office/mac/drawingml/2011/main" val="1"/>
             </a:ext>
           </a:extLst>
         </p:spPr>
@@ -24854,7 +24856,7 @@
           </a:ln>
           <a:extLst>
             <a:ext uri="{C572A759-6A51-4108-AA02-DFA0A04FC94B}">
-              <ma14:wrappingTextBoxFlag xmlns:ma14="http://schemas.microsoft.com/office/mac/drawingml/2011/main" xmlns:a14="http://schemas.microsoft.com/office/drawing/2010/main" xmlns:m="http://schemas.openxmlformats.org/officeDocument/2006/math" xmlns="" val="1"/>
+              <ma14:wrappingTextBoxFlag xmlns="" xmlns:m="http://schemas.openxmlformats.org/officeDocument/2006/math" xmlns:a14="http://schemas.microsoft.com/office/drawing/2010/main" xmlns:ma14="http://schemas.microsoft.com/office/mac/drawingml/2011/main" val="1"/>
             </a:ext>
           </a:extLst>
         </p:spPr>
@@ -25030,7 +25032,7 @@
           </a:ln>
           <a:extLst>
             <a:ext uri="{C572A759-6A51-4108-AA02-DFA0A04FC94B}">
-              <ma14:wrappingTextBoxFlag xmlns:ma14="http://schemas.microsoft.com/office/mac/drawingml/2011/main" xmlns:a14="http://schemas.microsoft.com/office/drawing/2010/main" xmlns:m="http://schemas.openxmlformats.org/officeDocument/2006/math" xmlns="" val="1"/>
+              <ma14:wrappingTextBoxFlag xmlns="" xmlns:m="http://schemas.openxmlformats.org/officeDocument/2006/math" xmlns:a14="http://schemas.microsoft.com/office/drawing/2010/main" xmlns:ma14="http://schemas.microsoft.com/office/mac/drawingml/2011/main" val="1"/>
             </a:ext>
           </a:extLst>
         </p:spPr>
@@ -25077,7 +25079,7 @@
           </a:ln>
           <a:extLst>
             <a:ext uri="{C572A759-6A51-4108-AA02-DFA0A04FC94B}">
-              <ma14:wrappingTextBoxFlag xmlns:ma14="http://schemas.microsoft.com/office/mac/drawingml/2011/main" xmlns:a14="http://schemas.microsoft.com/office/drawing/2010/main" xmlns:m="http://schemas.openxmlformats.org/officeDocument/2006/math" xmlns="" val="1"/>
+              <ma14:wrappingTextBoxFlag xmlns="" xmlns:m="http://schemas.openxmlformats.org/officeDocument/2006/math" xmlns:a14="http://schemas.microsoft.com/office/drawing/2010/main" xmlns:ma14="http://schemas.microsoft.com/office/mac/drawingml/2011/main" val="1"/>
             </a:ext>
           </a:extLst>
         </p:spPr>
@@ -25150,7 +25152,7 @@
           </a:ln>
           <a:extLst>
             <a:ext uri="{C572A759-6A51-4108-AA02-DFA0A04FC94B}">
-              <ma14:wrappingTextBoxFlag xmlns:ma14="http://schemas.microsoft.com/office/mac/drawingml/2011/main" xmlns:a14="http://schemas.microsoft.com/office/drawing/2010/main" xmlns:m="http://schemas.openxmlformats.org/officeDocument/2006/math" xmlns="" val="1"/>
+              <ma14:wrappingTextBoxFlag xmlns="" xmlns:m="http://schemas.openxmlformats.org/officeDocument/2006/math" xmlns:a14="http://schemas.microsoft.com/office/drawing/2010/main" xmlns:ma14="http://schemas.microsoft.com/office/mac/drawingml/2011/main" val="1"/>
             </a:ext>
           </a:extLst>
         </p:spPr>
@@ -25212,7 +25214,7 @@
           </a:ln>
           <a:extLst>
             <a:ext uri="{C572A759-6A51-4108-AA02-DFA0A04FC94B}">
-              <ma14:wrappingTextBoxFlag xmlns:ma14="http://schemas.microsoft.com/office/mac/drawingml/2011/main" xmlns:a14="http://schemas.microsoft.com/office/drawing/2010/main" xmlns:m="http://schemas.openxmlformats.org/officeDocument/2006/math" xmlns="" val="1"/>
+              <ma14:wrappingTextBoxFlag xmlns="" xmlns:m="http://schemas.openxmlformats.org/officeDocument/2006/math" xmlns:a14="http://schemas.microsoft.com/office/drawing/2010/main" xmlns:ma14="http://schemas.microsoft.com/office/mac/drawingml/2011/main" val="1"/>
             </a:ext>
           </a:extLst>
         </p:spPr>
@@ -25424,7 +25426,7 @@
           </a:ln>
           <a:extLst>
             <a:ext uri="{C572A759-6A51-4108-AA02-DFA0A04FC94B}">
-              <ma14:wrappingTextBoxFlag xmlns:ma14="http://schemas.microsoft.com/office/mac/drawingml/2011/main" xmlns:a14="http://schemas.microsoft.com/office/drawing/2010/main" xmlns:m="http://schemas.openxmlformats.org/officeDocument/2006/math" xmlns="" val="1"/>
+              <ma14:wrappingTextBoxFlag xmlns="" xmlns:m="http://schemas.openxmlformats.org/officeDocument/2006/math" xmlns:a14="http://schemas.microsoft.com/office/drawing/2010/main" xmlns:ma14="http://schemas.microsoft.com/office/mac/drawingml/2011/main" val="1"/>
             </a:ext>
           </a:extLst>
         </p:spPr>
@@ -25636,7 +25638,7 @@
           </a:ln>
           <a:extLst>
             <a:ext uri="{C572A759-6A51-4108-AA02-DFA0A04FC94B}">
-              <ma14:wrappingTextBoxFlag xmlns:ma14="http://schemas.microsoft.com/office/mac/drawingml/2011/main" xmlns:a14="http://schemas.microsoft.com/office/drawing/2010/main" xmlns:m="http://schemas.openxmlformats.org/officeDocument/2006/math" xmlns="" val="1"/>
+              <ma14:wrappingTextBoxFlag xmlns="" xmlns:m="http://schemas.openxmlformats.org/officeDocument/2006/math" xmlns:a14="http://schemas.microsoft.com/office/drawing/2010/main" xmlns:ma14="http://schemas.microsoft.com/office/mac/drawingml/2011/main" val="1"/>
             </a:ext>
           </a:extLst>
         </p:spPr>
@@ -25872,7 +25874,7 @@
           </a:ln>
           <a:extLst>
             <a:ext uri="{C572A759-6A51-4108-AA02-DFA0A04FC94B}">
-              <ma14:wrappingTextBoxFlag xmlns:ma14="http://schemas.microsoft.com/office/mac/drawingml/2011/main" xmlns:a14="http://schemas.microsoft.com/office/drawing/2010/main" xmlns:m="http://schemas.openxmlformats.org/officeDocument/2006/math" xmlns="" val="1"/>
+              <ma14:wrappingTextBoxFlag xmlns="" xmlns:m="http://schemas.openxmlformats.org/officeDocument/2006/math" xmlns:a14="http://schemas.microsoft.com/office/drawing/2010/main" xmlns:ma14="http://schemas.microsoft.com/office/mac/drawingml/2011/main" val="1"/>
             </a:ext>
           </a:extLst>
         </p:spPr>
@@ -26188,7 +26190,7 @@
           </a:ln>
           <a:extLst>
             <a:ext uri="{C572A759-6A51-4108-AA02-DFA0A04FC94B}">
-              <ma14:wrappingTextBoxFlag xmlns:ma14="http://schemas.microsoft.com/office/mac/drawingml/2011/main" xmlns:a14="http://schemas.microsoft.com/office/drawing/2010/main" xmlns:m="http://schemas.openxmlformats.org/officeDocument/2006/math" xmlns="" val="1"/>
+              <ma14:wrappingTextBoxFlag xmlns="" xmlns:m="http://schemas.openxmlformats.org/officeDocument/2006/math" xmlns:a14="http://schemas.microsoft.com/office/drawing/2010/main" xmlns:ma14="http://schemas.microsoft.com/office/mac/drawingml/2011/main" val="1"/>
             </a:ext>
           </a:extLst>
         </p:spPr>
@@ -26223,7 +26225,7 @@
           </a:ln>
           <a:extLst>
             <a:ext uri="{C572A759-6A51-4108-AA02-DFA0A04FC94B}">
-              <ma14:wrappingTextBoxFlag xmlns:ma14="http://schemas.microsoft.com/office/mac/drawingml/2011/main" xmlns:a14="http://schemas.microsoft.com/office/drawing/2010/main" xmlns:m="http://schemas.openxmlformats.org/officeDocument/2006/math" xmlns="" val="1"/>
+              <ma14:wrappingTextBoxFlag xmlns="" xmlns:m="http://schemas.openxmlformats.org/officeDocument/2006/math" xmlns:a14="http://schemas.microsoft.com/office/drawing/2010/main" xmlns:ma14="http://schemas.microsoft.com/office/mac/drawingml/2011/main" val="1"/>
             </a:ext>
           </a:extLst>
         </p:spPr>
@@ -26258,7 +26260,7 @@
           </a:ln>
           <a:extLst>
             <a:ext uri="{C572A759-6A51-4108-AA02-DFA0A04FC94B}">
-              <ma14:wrappingTextBoxFlag xmlns:ma14="http://schemas.microsoft.com/office/mac/drawingml/2011/main" xmlns:a14="http://schemas.microsoft.com/office/drawing/2010/main" xmlns:m="http://schemas.openxmlformats.org/officeDocument/2006/math" xmlns="" val="1"/>
+              <ma14:wrappingTextBoxFlag xmlns="" xmlns:m="http://schemas.openxmlformats.org/officeDocument/2006/math" xmlns:a14="http://schemas.microsoft.com/office/drawing/2010/main" xmlns:ma14="http://schemas.microsoft.com/office/mac/drawingml/2011/main" val="1"/>
             </a:ext>
           </a:extLst>
         </p:spPr>
@@ -26308,7 +26310,7 @@
           </a:ln>
           <a:extLst>
             <a:ext uri="{C572A759-6A51-4108-AA02-DFA0A04FC94B}">
-              <ma14:wrappingTextBoxFlag xmlns:ma14="http://schemas.microsoft.com/office/mac/drawingml/2011/main" xmlns:a14="http://schemas.microsoft.com/office/drawing/2010/main" xmlns:m="http://schemas.openxmlformats.org/officeDocument/2006/math" xmlns="" val="1"/>
+              <ma14:wrappingTextBoxFlag xmlns="" xmlns:m="http://schemas.openxmlformats.org/officeDocument/2006/math" xmlns:a14="http://schemas.microsoft.com/office/drawing/2010/main" xmlns:ma14="http://schemas.microsoft.com/office/mac/drawingml/2011/main" val="1"/>
             </a:ext>
           </a:extLst>
         </p:spPr>
@@ -26349,7 +26351,7 @@
           </a:ln>
           <a:extLst>
             <a:ext uri="{C572A759-6A51-4108-AA02-DFA0A04FC94B}">
-              <ma14:wrappingTextBoxFlag xmlns:ma14="http://schemas.microsoft.com/office/mac/drawingml/2011/main" xmlns:a14="http://schemas.microsoft.com/office/drawing/2010/main" xmlns:m="http://schemas.openxmlformats.org/officeDocument/2006/math" xmlns="" val="1"/>
+              <ma14:wrappingTextBoxFlag xmlns="" xmlns:m="http://schemas.openxmlformats.org/officeDocument/2006/math" xmlns:a14="http://schemas.microsoft.com/office/drawing/2010/main" xmlns:ma14="http://schemas.microsoft.com/office/mac/drawingml/2011/main" val="1"/>
             </a:ext>
           </a:extLst>
         </p:spPr>
@@ -26604,7 +26606,7 @@
           </a:ln>
           <a:extLst>
             <a:ext uri="{C572A759-6A51-4108-AA02-DFA0A04FC94B}">
-              <ma14:wrappingTextBoxFlag xmlns:ma14="http://schemas.microsoft.com/office/mac/drawingml/2011/main" xmlns:a14="http://schemas.microsoft.com/office/drawing/2010/main" xmlns:m="http://schemas.openxmlformats.org/officeDocument/2006/math" xmlns="" val="1"/>
+              <ma14:wrappingTextBoxFlag xmlns="" xmlns:m="http://schemas.openxmlformats.org/officeDocument/2006/math" xmlns:a14="http://schemas.microsoft.com/office/drawing/2010/main" xmlns:ma14="http://schemas.microsoft.com/office/mac/drawingml/2011/main" val="1"/>
             </a:ext>
           </a:extLst>
         </p:spPr>
@@ -26639,7 +26641,7 @@
           </a:ln>
           <a:extLst>
             <a:ext uri="{C572A759-6A51-4108-AA02-DFA0A04FC94B}">
-              <ma14:wrappingTextBoxFlag xmlns:ma14="http://schemas.microsoft.com/office/mac/drawingml/2011/main" xmlns:a14="http://schemas.microsoft.com/office/drawing/2010/main" xmlns:m="http://schemas.openxmlformats.org/officeDocument/2006/math" xmlns="" val="1"/>
+              <ma14:wrappingTextBoxFlag xmlns="" xmlns:m="http://schemas.openxmlformats.org/officeDocument/2006/math" xmlns:a14="http://schemas.microsoft.com/office/drawing/2010/main" xmlns:ma14="http://schemas.microsoft.com/office/mac/drawingml/2011/main" val="1"/>
             </a:ext>
           </a:extLst>
         </p:spPr>
@@ -26674,7 +26676,7 @@
           </a:ln>
           <a:extLst>
             <a:ext uri="{C572A759-6A51-4108-AA02-DFA0A04FC94B}">
-              <ma14:wrappingTextBoxFlag xmlns:ma14="http://schemas.microsoft.com/office/mac/drawingml/2011/main" xmlns:a14="http://schemas.microsoft.com/office/drawing/2010/main" xmlns:m="http://schemas.openxmlformats.org/officeDocument/2006/math" xmlns="" val="1"/>
+              <ma14:wrappingTextBoxFlag xmlns="" xmlns:m="http://schemas.openxmlformats.org/officeDocument/2006/math" xmlns:a14="http://schemas.microsoft.com/office/drawing/2010/main" xmlns:ma14="http://schemas.microsoft.com/office/mac/drawingml/2011/main" val="1"/>
             </a:ext>
           </a:extLst>
         </p:spPr>
@@ -26916,7 +26918,7 @@
           </a:ln>
           <a:extLst>
             <a:ext uri="{C572A759-6A51-4108-AA02-DFA0A04FC94B}">
-              <ma14:wrappingTextBoxFlag xmlns:ma14="http://schemas.microsoft.com/office/mac/drawingml/2011/main" xmlns:a14="http://schemas.microsoft.com/office/drawing/2010/main" xmlns:m="http://schemas.openxmlformats.org/officeDocument/2006/math" xmlns="" val="1"/>
+              <ma14:wrappingTextBoxFlag xmlns="" xmlns:m="http://schemas.openxmlformats.org/officeDocument/2006/math" xmlns:a14="http://schemas.microsoft.com/office/drawing/2010/main" xmlns:ma14="http://schemas.microsoft.com/office/mac/drawingml/2011/main" val="1"/>
             </a:ext>
           </a:extLst>
         </p:spPr>
@@ -27141,7 +27143,7 @@
           </a:ln>
           <a:extLst>
             <a:ext uri="{C572A759-6A51-4108-AA02-DFA0A04FC94B}">
-              <ma14:wrappingTextBoxFlag xmlns:ma14="http://schemas.microsoft.com/office/mac/drawingml/2011/main" xmlns:a14="http://schemas.microsoft.com/office/drawing/2010/main" xmlns:m="http://schemas.openxmlformats.org/officeDocument/2006/math" xmlns="" val="1"/>
+              <ma14:wrappingTextBoxFlag xmlns="" xmlns:m="http://schemas.openxmlformats.org/officeDocument/2006/math" xmlns:a14="http://schemas.microsoft.com/office/drawing/2010/main" xmlns:ma14="http://schemas.microsoft.com/office/mac/drawingml/2011/main" val="1"/>
             </a:ext>
           </a:extLst>
         </p:spPr>
@@ -27189,7 +27191,7 @@
           </a:ln>
           <a:extLst>
             <a:ext uri="{C572A759-6A51-4108-AA02-DFA0A04FC94B}">
-              <ma14:wrappingTextBoxFlag xmlns:ma14="http://schemas.microsoft.com/office/mac/drawingml/2011/main" xmlns:a14="http://schemas.microsoft.com/office/drawing/2010/main" xmlns:m="http://schemas.openxmlformats.org/officeDocument/2006/math" xmlns="" val="1"/>
+              <ma14:wrappingTextBoxFlag xmlns="" xmlns:m="http://schemas.openxmlformats.org/officeDocument/2006/math" xmlns:a14="http://schemas.microsoft.com/office/drawing/2010/main" xmlns:ma14="http://schemas.microsoft.com/office/mac/drawingml/2011/main" val="1"/>
             </a:ext>
           </a:extLst>
         </p:spPr>
@@ -27366,7 +27368,7 @@
           </a:ln>
           <a:extLst>
             <a:ext uri="{C572A759-6A51-4108-AA02-DFA0A04FC94B}">
-              <ma14:wrappingTextBoxFlag xmlns:ma14="http://schemas.microsoft.com/office/mac/drawingml/2011/main" xmlns:a14="http://schemas.microsoft.com/office/drawing/2010/main" xmlns:m="http://schemas.openxmlformats.org/officeDocument/2006/math" xmlns="" val="1"/>
+              <ma14:wrappingTextBoxFlag xmlns="" xmlns:m="http://schemas.openxmlformats.org/officeDocument/2006/math" xmlns:a14="http://schemas.microsoft.com/office/drawing/2010/main" xmlns:ma14="http://schemas.microsoft.com/office/mac/drawingml/2011/main" val="1"/>
             </a:ext>
           </a:extLst>
         </p:spPr>
@@ -27610,7 +27612,7 @@
           </a:ln>
           <a:extLst>
             <a:ext uri="{C572A759-6A51-4108-AA02-DFA0A04FC94B}">
-              <ma14:wrappingTextBoxFlag xmlns:ma14="http://schemas.microsoft.com/office/mac/drawingml/2011/main" xmlns:a14="http://schemas.microsoft.com/office/drawing/2010/main" xmlns:m="http://schemas.openxmlformats.org/officeDocument/2006/math" xmlns="" val="1"/>
+              <ma14:wrappingTextBoxFlag xmlns="" xmlns:m="http://schemas.openxmlformats.org/officeDocument/2006/math" xmlns:a14="http://schemas.microsoft.com/office/drawing/2010/main" xmlns:ma14="http://schemas.microsoft.com/office/mac/drawingml/2011/main" val="1"/>
             </a:ext>
           </a:extLst>
         </p:spPr>
@@ -27645,7 +27647,7 @@
           </a:ln>
           <a:extLst>
             <a:ext uri="{C572A759-6A51-4108-AA02-DFA0A04FC94B}">
-              <ma14:wrappingTextBoxFlag xmlns:ma14="http://schemas.microsoft.com/office/mac/drawingml/2011/main" xmlns:a14="http://schemas.microsoft.com/office/drawing/2010/main" xmlns:m="http://schemas.openxmlformats.org/officeDocument/2006/math" xmlns="" val="1"/>
+              <ma14:wrappingTextBoxFlag xmlns="" xmlns:m="http://schemas.openxmlformats.org/officeDocument/2006/math" xmlns:a14="http://schemas.microsoft.com/office/drawing/2010/main" xmlns:ma14="http://schemas.microsoft.com/office/mac/drawingml/2011/main" val="1"/>
             </a:ext>
           </a:extLst>
         </p:spPr>
@@ -27680,7 +27682,7 @@
           </a:ln>
           <a:extLst>
             <a:ext uri="{C572A759-6A51-4108-AA02-DFA0A04FC94B}">
-              <ma14:wrappingTextBoxFlag xmlns:ma14="http://schemas.microsoft.com/office/mac/drawingml/2011/main" xmlns:a14="http://schemas.microsoft.com/office/drawing/2010/main" xmlns:m="http://schemas.openxmlformats.org/officeDocument/2006/math" xmlns="" val="1"/>
+              <ma14:wrappingTextBoxFlag xmlns="" xmlns:m="http://schemas.openxmlformats.org/officeDocument/2006/math" xmlns:a14="http://schemas.microsoft.com/office/drawing/2010/main" xmlns:ma14="http://schemas.microsoft.com/office/mac/drawingml/2011/main" val="1"/>
             </a:ext>
           </a:extLst>
         </p:spPr>
@@ -27922,7 +27924,7 @@
           </a:ln>
           <a:extLst>
             <a:ext uri="{C572A759-6A51-4108-AA02-DFA0A04FC94B}">
-              <ma14:wrappingTextBoxFlag xmlns:ma14="http://schemas.microsoft.com/office/mac/drawingml/2011/main" xmlns:a14="http://schemas.microsoft.com/office/drawing/2010/main" xmlns:m="http://schemas.openxmlformats.org/officeDocument/2006/math" xmlns="" val="1"/>
+              <ma14:wrappingTextBoxFlag xmlns="" xmlns:m="http://schemas.openxmlformats.org/officeDocument/2006/math" xmlns:a14="http://schemas.microsoft.com/office/drawing/2010/main" xmlns:ma14="http://schemas.microsoft.com/office/mac/drawingml/2011/main" val="1"/>
             </a:ext>
           </a:extLst>
         </p:spPr>
@@ -28147,7 +28149,7 @@
           </a:ln>
           <a:extLst>
             <a:ext uri="{C572A759-6A51-4108-AA02-DFA0A04FC94B}">
-              <ma14:wrappingTextBoxFlag xmlns:ma14="http://schemas.microsoft.com/office/mac/drawingml/2011/main" xmlns:a14="http://schemas.microsoft.com/office/drawing/2010/main" xmlns:m="http://schemas.openxmlformats.org/officeDocument/2006/math" xmlns="" val="1"/>
+              <ma14:wrappingTextBoxFlag xmlns="" xmlns:m="http://schemas.openxmlformats.org/officeDocument/2006/math" xmlns:a14="http://schemas.microsoft.com/office/drawing/2010/main" xmlns:ma14="http://schemas.microsoft.com/office/mac/drawingml/2011/main" val="1"/>
             </a:ext>
           </a:extLst>
         </p:spPr>
@@ -28195,7 +28197,7 @@
           </a:ln>
           <a:extLst>
             <a:ext uri="{C572A759-6A51-4108-AA02-DFA0A04FC94B}">
-              <ma14:wrappingTextBoxFlag xmlns:ma14="http://schemas.microsoft.com/office/mac/drawingml/2011/main" xmlns:a14="http://schemas.microsoft.com/office/drawing/2010/main" xmlns:m="http://schemas.openxmlformats.org/officeDocument/2006/math" xmlns="" val="1"/>
+              <ma14:wrappingTextBoxFlag xmlns="" xmlns:m="http://schemas.openxmlformats.org/officeDocument/2006/math" xmlns:a14="http://schemas.microsoft.com/office/drawing/2010/main" xmlns:ma14="http://schemas.microsoft.com/office/mac/drawingml/2011/main" val="1"/>
             </a:ext>
           </a:extLst>
         </p:spPr>
@@ -28372,7 +28374,7 @@
           </a:ln>
           <a:extLst>
             <a:ext uri="{C572A759-6A51-4108-AA02-DFA0A04FC94B}">
-              <ma14:wrappingTextBoxFlag xmlns:ma14="http://schemas.microsoft.com/office/mac/drawingml/2011/main" xmlns:a14="http://schemas.microsoft.com/office/drawing/2010/main" xmlns:m="http://schemas.openxmlformats.org/officeDocument/2006/math" xmlns="" val="1"/>
+              <ma14:wrappingTextBoxFlag xmlns="" xmlns:m="http://schemas.openxmlformats.org/officeDocument/2006/math" xmlns:a14="http://schemas.microsoft.com/office/drawing/2010/main" xmlns:ma14="http://schemas.microsoft.com/office/mac/drawingml/2011/main" val="1"/>
             </a:ext>
           </a:extLst>
         </p:spPr>
@@ -28490,7 +28492,7 @@
       </p:grpSpPr>
       <p:sp>
         <p:nvSpPr>
-          <p:cNvPr id="605" name="Demo 1: Score Tracker"/>
+          <p:cNvPr id="1039" name="Demo 1: add numbers in a file"/>
           <p:cNvSpPr txBox="1">
             <a:spLocks noGrp="1"/>
           </p:cNvSpPr>
@@ -28516,14 +28518,14 @@
           </a:lstStyle>
           <a:p>
             <a:r>
-              <a:t>Demo 1: Score Tracker</a:t>
-            </a:r>
-          </a:p>
-        </p:txBody>
-      </p:sp>
-      <p:sp>
-        <p:nvSpPr>
-          <p:cNvPr id="606" name="Goal: tally up points, and print who is winning…"/>
+              <a:t>Demo 1: add numbers in a file</a:t>
+            </a:r>
+          </a:p>
+        </p:txBody>
+      </p:sp>
+      <p:sp>
+        <p:nvSpPr>
+          <p:cNvPr id="1040" name="Goal: read all lines from a file as integers and add them…"/>
           <p:cNvSpPr txBox="1">
             <a:spLocks noGrp="1"/>
           </p:cNvSpPr>
@@ -28533,8 +28535,8 @@
         </p:nvSpPr>
         <p:spPr>
           <a:xfrm>
-            <a:off x="952500" y="1411684"/>
-            <a:ext cx="11540877" cy="7860706"/>
+            <a:off x="952500" y="1587896"/>
+            <a:ext cx="11540877" cy="7684494"/>
           </a:xfrm>
           <a:prstGeom prst="rect">
             <a:avLst/>
@@ -28558,24 +28560,19 @@
               </a:defRPr>
             </a:pPr>
             <a:r>
-              <a:rPr dirty="0"/>
-              <a:t>Goal: tally up points, and print who is winning</a:t>
+              <a:t>Goal: read all lines from a file as integers and add them</a:t>
             </a:r>
           </a:p>
           <a:p>
             <a:pPr marL="0" lvl="5" indent="0">
-              <a:spcBef>
-                <a:spcPts val="1600"/>
-              </a:spcBef>
               <a:buSzTx/>
               <a:buNone/>
             </a:pPr>
             <a:r>
-              <a:rPr b="1" dirty="0"/>
+              <a:rPr b="1"/>
               <a:t>Input</a:t>
             </a:r>
             <a:r>
-              <a:rPr dirty="0"/>
               <a:t>:</a:t>
             </a:r>
           </a:p>
@@ -28587,24 +28584,34 @@
               <a:defRPr sz="2800"/>
             </a:pPr>
             <a:r>
-              <a:rPr dirty="0"/>
-              <a:t>Person who just scored</a:t>
+              <a:t>file containing </a:t>
+            </a:r>
+            <a:r>
+              <a:rPr b="1">
+                <a:solidFill>
+                  <a:schemeClr val="accent5">
+                    <a:hueOff val="-82419"/>
+                    <a:satOff val="-9513"/>
+                    <a:lumOff val="-16343"/>
+                  </a:schemeClr>
+                </a:solidFill>
+              </a:rPr>
+              <a:t>50 million numbers</a:t>
+            </a:r>
+            <a:r>
+              <a:t> between 0 and 100</a:t>
             </a:r>
           </a:p>
           <a:p>
             <a:pPr marL="0" lvl="5" indent="0">
-              <a:spcBef>
-                <a:spcPts val="1600"/>
-              </a:spcBef>
               <a:buSzTx/>
               <a:buNone/>
             </a:pPr>
             <a:r>
-              <a:rPr b="1" dirty="0"/>
+              <a:rPr b="1"/>
               <a:t>Output</a:t>
             </a:r>
             <a:r>
-              <a:rPr dirty="0"/>
               <a:t>:</a:t>
             </a:r>
           </a:p>
@@ -28616,34 +28623,27 @@
               <a:defRPr sz="2800"/>
             </a:pPr>
             <a:r>
-              <a:rPr dirty="0"/>
-              <a:t>Everybody’s score</a:t>
+              <a:t>The sum of the numbers</a:t>
             </a:r>
           </a:p>
           <a:p>
             <a:pPr marL="0" lvl="5" indent="0">
-              <a:spcBef>
-                <a:spcPts val="1600"/>
-              </a:spcBef>
               <a:buSzTx/>
               <a:buNone/>
             </a:pPr>
             <a:r>
-              <a:rPr b="1" dirty="0"/>
+              <a:rPr b="1"/>
               <a:t>Example</a:t>
             </a:r>
             <a:r>
-              <a:rPr dirty="0"/>
               <a:t>:</a:t>
             </a:r>
+            <a:br/>
             <a:br>
-              <a:rPr dirty="0"/>
+              <a:rPr sz="2200"/>
             </a:br>
-            <a:br>
-              <a:rPr sz="900" dirty="0"/>
-            </a:br>
-            <a:r>
-              <a:rPr sz="2800" dirty="0">
+            <a:r>
+              <a:rPr sz="2600">
                 <a:latin typeface="Courier"/>
                 <a:ea typeface="Courier"/>
                 <a:cs typeface="Courier"/>
@@ -28652,43 +28652,16 @@
               <a:t>prompt&gt; </a:t>
             </a:r>
             <a:r>
-              <a:rPr sz="2800" b="1" dirty="0">
+              <a:rPr sz="2600" b="1">
                 <a:latin typeface="Courier"/>
                 <a:ea typeface="Courier"/>
                 <a:cs typeface="Courier"/>
                 <a:sym typeface="Courier"/>
               </a:rPr>
-              <a:t>python </a:t>
-            </a:r>
-            <a:r>
-              <a:rPr sz="2800" b="1" dirty="0" err="1">
-                <a:latin typeface="Courier"/>
-                <a:ea typeface="Courier"/>
-                <a:cs typeface="Courier"/>
-                <a:sym typeface="Courier"/>
-              </a:rPr>
-              <a:t>point.py</a:t>
-            </a:r>
-            <a:r>
-              <a:rPr sz="2800" b="1" dirty="0">
-                <a:latin typeface="Courier"/>
-                <a:ea typeface="Courier"/>
-                <a:cs typeface="Courier"/>
-                <a:sym typeface="Courier"/>
-              </a:rPr>
-              <a:t> </a:t>
-            </a:r>
-            <a:r>
-              <a:rPr sz="2800" b="1" dirty="0" err="1">
-                <a:latin typeface="Courier"/>
-                <a:ea typeface="Courier"/>
-                <a:cs typeface="Courier"/>
-                <a:sym typeface="Courier"/>
-              </a:rPr>
-              <a:t>alice</a:t>
+              <a:t>python sum.py</a:t>
             </a:r>
             <a:br>
-              <a:rPr sz="2800" dirty="0">
+              <a:rPr sz="2600">
                 <a:latin typeface="Courier"/>
                 <a:ea typeface="Courier"/>
                 <a:cs typeface="Courier"/>
@@ -28696,212 +28669,103 @@
               </a:rPr>
             </a:br>
             <a:r>
-              <a:rPr sz="2800" dirty="0" err="1">
+              <a:rPr sz="2600">
                 <a:latin typeface="Courier"/>
                 <a:ea typeface="Courier"/>
                 <a:cs typeface="Courier"/>
                 <a:sym typeface="Courier"/>
               </a:rPr>
-              <a:t>alice</a:t>
-            </a:r>
-            <a:r>
-              <a:rPr sz="2800" dirty="0">
-                <a:latin typeface="Courier"/>
-                <a:ea typeface="Courier"/>
-                <a:cs typeface="Courier"/>
-                <a:sym typeface="Courier"/>
-              </a:rPr>
-              <a:t>: 1</a:t>
+              <a:t>2499463617</a:t>
             </a:r>
           </a:p>
           <a:p>
             <a:pPr marL="0" lvl="5" indent="0">
-              <a:spcBef>
-                <a:spcPts val="1600"/>
-              </a:spcBef>
               <a:buSzTx/>
               <a:buNone/>
             </a:pPr>
             <a:r>
-              <a:rPr sz="2800" dirty="0">
-                <a:latin typeface="Courier"/>
-                <a:ea typeface="Courier"/>
-                <a:cs typeface="Courier"/>
-                <a:sym typeface="Courier"/>
-              </a:rPr>
-              <a:t>prompt&gt; </a:t>
-            </a:r>
-            <a:r>
-              <a:rPr sz="2800" b="1" dirty="0">
-                <a:latin typeface="Courier"/>
-                <a:ea typeface="Courier"/>
-                <a:cs typeface="Courier"/>
-                <a:sym typeface="Courier"/>
-              </a:rPr>
-              <a:t>python </a:t>
-            </a:r>
-            <a:r>
-              <a:rPr sz="2800" b="1" dirty="0" err="1">
-                <a:latin typeface="Courier"/>
-                <a:ea typeface="Courier"/>
-                <a:cs typeface="Courier"/>
-                <a:sym typeface="Courier"/>
-              </a:rPr>
-              <a:t>point.py</a:t>
-            </a:r>
-            <a:r>
-              <a:rPr sz="2800" b="1" dirty="0">
-                <a:latin typeface="Courier"/>
-                <a:ea typeface="Courier"/>
-                <a:cs typeface="Courier"/>
-                <a:sym typeface="Courier"/>
-              </a:rPr>
-              <a:t> bob</a:t>
-            </a:r>
-            <a:br>
-              <a:rPr sz="2800" dirty="0">
-                <a:latin typeface="Courier"/>
-                <a:ea typeface="Courier"/>
-                <a:cs typeface="Courier"/>
-                <a:sym typeface="Courier"/>
-              </a:rPr>
-            </a:br>
-            <a:r>
-              <a:rPr sz="2800" dirty="0" err="1">
-                <a:latin typeface="Courier"/>
-                <a:ea typeface="Courier"/>
-                <a:cs typeface="Courier"/>
-                <a:sym typeface="Courier"/>
-              </a:rPr>
-              <a:t>alice</a:t>
-            </a:r>
-            <a:r>
-              <a:rPr sz="2800" dirty="0">
-                <a:latin typeface="Courier"/>
-                <a:ea typeface="Courier"/>
-                <a:cs typeface="Courier"/>
-                <a:sym typeface="Courier"/>
-              </a:rPr>
-              <a:t>: 1</a:t>
-            </a:r>
-            <a:br>
-              <a:rPr sz="2800" dirty="0">
-                <a:latin typeface="Courier"/>
-                <a:ea typeface="Courier"/>
-                <a:cs typeface="Courier"/>
-                <a:sym typeface="Courier"/>
-              </a:rPr>
-            </a:br>
-            <a:r>
-              <a:rPr sz="2800" dirty="0">
-                <a:latin typeface="Courier"/>
-                <a:ea typeface="Courier"/>
-                <a:cs typeface="Courier"/>
-                <a:sym typeface="Courier"/>
-              </a:rPr>
-              <a:t>bob: 1</a:t>
-            </a:r>
-          </a:p>
-          <a:p>
-            <a:pPr marL="0" lvl="5" indent="0">
+              <a:rPr b="1"/>
+              <a:t>Two ways</a:t>
+            </a:r>
+            <a:r>
+              <a:t>:</a:t>
+            </a:r>
+          </a:p>
+          <a:p>
+            <a:pPr marL="635000" indent="-444500">
               <a:spcBef>
-                <a:spcPts val="1600"/>
+                <a:spcPts val="0"/>
               </a:spcBef>
-              <a:buSzTx/>
-              <a:buNone/>
-            </a:pPr>
-            <a:r>
-              <a:rPr sz="2800" dirty="0">
-                <a:latin typeface="Courier"/>
-                <a:ea typeface="Courier"/>
-                <a:cs typeface="Courier"/>
-                <a:sym typeface="Courier"/>
-              </a:rPr>
-              <a:t>prompt&gt; </a:t>
-            </a:r>
-            <a:r>
-              <a:rPr sz="2800" b="1" dirty="0">
-                <a:latin typeface="Courier"/>
-                <a:ea typeface="Courier"/>
-                <a:cs typeface="Courier"/>
-                <a:sym typeface="Courier"/>
-              </a:rPr>
-              <a:t>python </a:t>
-            </a:r>
-            <a:r>
-              <a:rPr sz="2800" b="1" dirty="0" err="1">
-                <a:latin typeface="Courier"/>
-                <a:ea typeface="Courier"/>
-                <a:cs typeface="Courier"/>
-                <a:sym typeface="Courier"/>
-              </a:rPr>
-              <a:t>point.py</a:t>
-            </a:r>
-            <a:r>
-              <a:rPr sz="2800" b="1" dirty="0">
-                <a:latin typeface="Courier"/>
-                <a:ea typeface="Courier"/>
-                <a:cs typeface="Courier"/>
-                <a:sym typeface="Courier"/>
-              </a:rPr>
-              <a:t> </a:t>
-            </a:r>
-            <a:r>
-              <a:rPr sz="2800" b="1" dirty="0" err="1">
-                <a:latin typeface="Courier"/>
-                <a:ea typeface="Courier"/>
-                <a:cs typeface="Courier"/>
-                <a:sym typeface="Courier"/>
-              </a:rPr>
-              <a:t>alice</a:t>
-            </a:r>
-            <a:br>
-              <a:rPr sz="2800" dirty="0">
-                <a:latin typeface="Courier"/>
-                <a:ea typeface="Courier"/>
-                <a:cs typeface="Courier"/>
-                <a:sym typeface="Courier"/>
-              </a:rPr>
-            </a:br>
-            <a:r>
-              <a:rPr sz="2800" dirty="0" err="1">
-                <a:latin typeface="Courier"/>
-                <a:ea typeface="Courier"/>
-                <a:cs typeface="Courier"/>
-                <a:sym typeface="Courier"/>
-              </a:rPr>
-              <a:t>alice</a:t>
-            </a:r>
-            <a:r>
-              <a:rPr sz="2800" dirty="0">
-                <a:latin typeface="Courier"/>
-                <a:ea typeface="Courier"/>
-                <a:cs typeface="Courier"/>
-                <a:sym typeface="Courier"/>
-              </a:rPr>
-              <a:t>: 2</a:t>
-            </a:r>
-            <a:br>
-              <a:rPr sz="2800" dirty="0">
-                <a:latin typeface="Courier"/>
-                <a:ea typeface="Courier"/>
-                <a:cs typeface="Courier"/>
-                <a:sym typeface="Courier"/>
-              </a:rPr>
-            </a:br>
-            <a:r>
-              <a:rPr sz="2800" dirty="0">
-                <a:latin typeface="Courier"/>
-                <a:ea typeface="Courier"/>
-                <a:cs typeface="Courier"/>
-                <a:sym typeface="Courier"/>
-              </a:rPr>
-              <a:t>bob: 1</a:t>
+              <a:defRPr sz="2800"/>
+            </a:pPr>
+            <a:r>
+              <a:t>Put all lines in a list first</a:t>
+            </a:r>
+          </a:p>
+          <a:p>
+            <a:pPr marL="635000" indent="-444500">
+              <a:spcBef>
+                <a:spcPts val="0"/>
+              </a:spcBef>
+              <a:defRPr sz="2800"/>
+            </a:pPr>
+            <a:r>
+              <a:t>Directly use iterable file</a:t>
+            </a:r>
+          </a:p>
+        </p:txBody>
+      </p:sp>
+      <p:sp>
+        <p:nvSpPr>
+          <p:cNvPr id="1041" name="Bonus: create generator function…"/>
+          <p:cNvSpPr txBox="1"/>
+          <p:nvPr/>
+        </p:nvSpPr>
+        <p:spPr>
+          <a:xfrm>
+            <a:off x="7671767" y="7962230"/>
+            <a:ext cx="4493866" cy="814140"/>
+          </a:xfrm>
+          <a:prstGeom prst="rect">
+            <a:avLst/>
+          </a:prstGeom>
+          <a:ln w="12700">
+            <a:miter lim="400000"/>
+          </a:ln>
+          <a:extLst>
+            <a:ext uri="{C572A759-6A51-4108-AA02-DFA0A04FC94B}">
+              <ma14:wrappingTextBoxFlag xmlns="" xmlns:m="http://schemas.openxmlformats.org/officeDocument/2006/math" xmlns:a14="http://schemas.microsoft.com/office/drawing/2010/main" xmlns:ma14="http://schemas.microsoft.com/office/mac/drawingml/2011/main" val="1"/>
+            </a:ext>
+          </a:extLst>
+        </p:spPr>
+        <p:txBody>
+          <a:bodyPr wrap="none" lIns="50800" tIns="50800" rIns="50800" bIns="50800" anchor="ctr">
+            <a:spAutoFit/>
+          </a:bodyPr>
+          <a:lstStyle/>
+          <a:p>
+            <a:r>
+              <a:t>Bonus: </a:t>
+            </a:r>
+            <a:r>
+              <a:rPr b="0"/>
+              <a:t>create generator function</a:t>
+            </a:r>
+          </a:p>
+          <a:p>
+            <a:r>
+              <a:rPr b="0"/>
+              <a:t>that does the str =&gt; int conversion</a:t>
             </a:r>
           </a:p>
         </p:txBody>
       </p:sp>
     </p:spTree>
+    <p:extLst>
+      <p:ext uri="{BB962C8B-B14F-4D97-AF65-F5344CB8AC3E}">
+        <p14:creationId xmlns:p14="http://schemas.microsoft.com/office/powerpoint/2010/main" val="585970053"/>
+      </p:ext>
+    </p:extLst>
   </p:cSld>
   <p:clrMapOvr>
     <a:masterClrMapping/>
@@ -28929,6 +28793,455 @@
       </p:grpSpPr>
       <p:sp>
         <p:nvSpPr>
+          <p:cNvPr id="605" name="Demo 1: Score Tracker"/>
+          <p:cNvSpPr txBox="1">
+            <a:spLocks noGrp="1"/>
+          </p:cNvSpPr>
+          <p:nvPr>
+            <p:ph type="title"/>
+          </p:nvPr>
+        </p:nvSpPr>
+        <p:spPr>
+          <a:xfrm>
+            <a:off x="952500" y="254000"/>
+            <a:ext cx="11099800" cy="902345"/>
+          </a:xfrm>
+          <a:prstGeom prst="rect">
+            <a:avLst/>
+          </a:prstGeom>
+        </p:spPr>
+        <p:txBody>
+          <a:bodyPr/>
+          <a:lstStyle>
+            <a:lvl1pPr algn="l">
+              <a:defRPr sz="4800"/>
+            </a:lvl1pPr>
+          </a:lstStyle>
+          <a:p>
+            <a:r>
+              <a:rPr lang="en-US" dirty="0"/>
+              <a:t>Challenge - </a:t>
+            </a:r>
+            <a:r>
+              <a:rPr dirty="0"/>
+              <a:t>Demo 1: Score Tracker</a:t>
+            </a:r>
+          </a:p>
+        </p:txBody>
+      </p:sp>
+      <p:sp>
+        <p:nvSpPr>
+          <p:cNvPr id="606" name="Goal: tally up points, and print who is winning…"/>
+          <p:cNvSpPr txBox="1">
+            <a:spLocks noGrp="1"/>
+          </p:cNvSpPr>
+          <p:nvPr>
+            <p:ph type="body" idx="1"/>
+          </p:nvPr>
+        </p:nvSpPr>
+        <p:spPr>
+          <a:xfrm>
+            <a:off x="952500" y="1411684"/>
+            <a:ext cx="11540877" cy="7860706"/>
+          </a:xfrm>
+          <a:prstGeom prst="rect">
+            <a:avLst/>
+          </a:prstGeom>
+        </p:spPr>
+        <p:txBody>
+          <a:bodyPr anchor="t"/>
+          <a:lstStyle/>
+          <a:p>
+            <a:pPr marL="0" lvl="5" indent="0">
+              <a:buSzTx/>
+              <a:buNone/>
+              <a:defRPr>
+                <a:solidFill>
+                  <a:schemeClr val="accent5">
+                    <a:hueOff val="-82419"/>
+                    <a:satOff val="-9513"/>
+                    <a:lumOff val="-16343"/>
+                  </a:schemeClr>
+                </a:solidFill>
+              </a:defRPr>
+            </a:pPr>
+            <a:r>
+              <a:rPr dirty="0"/>
+              <a:t>Goal: tally up points, and print who is winning</a:t>
+            </a:r>
+          </a:p>
+          <a:p>
+            <a:pPr marL="0" lvl="5" indent="0">
+              <a:spcBef>
+                <a:spcPts val="1600"/>
+              </a:spcBef>
+              <a:buSzTx/>
+              <a:buNone/>
+            </a:pPr>
+            <a:r>
+              <a:rPr b="1" dirty="0"/>
+              <a:t>Input</a:t>
+            </a:r>
+            <a:r>
+              <a:rPr dirty="0"/>
+              <a:t>:</a:t>
+            </a:r>
+          </a:p>
+          <a:p>
+            <a:pPr marL="635000" indent="-444500">
+              <a:spcBef>
+                <a:spcPts val="0"/>
+              </a:spcBef>
+              <a:defRPr sz="2800"/>
+            </a:pPr>
+            <a:r>
+              <a:rPr dirty="0"/>
+              <a:t>Person who just scored</a:t>
+            </a:r>
+          </a:p>
+          <a:p>
+            <a:pPr marL="0" lvl="5" indent="0">
+              <a:spcBef>
+                <a:spcPts val="1600"/>
+              </a:spcBef>
+              <a:buSzTx/>
+              <a:buNone/>
+            </a:pPr>
+            <a:r>
+              <a:rPr b="1" dirty="0"/>
+              <a:t>Output</a:t>
+            </a:r>
+            <a:r>
+              <a:rPr dirty="0"/>
+              <a:t>:</a:t>
+            </a:r>
+          </a:p>
+          <a:p>
+            <a:pPr marL="635000" indent="-444500">
+              <a:spcBef>
+                <a:spcPts val="0"/>
+              </a:spcBef>
+              <a:defRPr sz="2800"/>
+            </a:pPr>
+            <a:r>
+              <a:rPr dirty="0"/>
+              <a:t>Everybody’s score</a:t>
+            </a:r>
+          </a:p>
+          <a:p>
+            <a:pPr marL="0" lvl="5" indent="0">
+              <a:spcBef>
+                <a:spcPts val="1600"/>
+              </a:spcBef>
+              <a:buSzTx/>
+              <a:buNone/>
+            </a:pPr>
+            <a:r>
+              <a:rPr b="1" dirty="0"/>
+              <a:t>Example</a:t>
+            </a:r>
+            <a:r>
+              <a:rPr dirty="0"/>
+              <a:t>:</a:t>
+            </a:r>
+            <a:br>
+              <a:rPr dirty="0"/>
+            </a:br>
+            <a:br>
+              <a:rPr sz="900" dirty="0"/>
+            </a:br>
+            <a:r>
+              <a:rPr sz="2800" dirty="0">
+                <a:latin typeface="Courier"/>
+                <a:ea typeface="Courier"/>
+                <a:cs typeface="Courier"/>
+                <a:sym typeface="Courier"/>
+              </a:rPr>
+              <a:t>prompt&gt; </a:t>
+            </a:r>
+            <a:r>
+              <a:rPr sz="2800" b="1" dirty="0">
+                <a:latin typeface="Courier"/>
+                <a:ea typeface="Courier"/>
+                <a:cs typeface="Courier"/>
+                <a:sym typeface="Courier"/>
+              </a:rPr>
+              <a:t>python </a:t>
+            </a:r>
+            <a:r>
+              <a:rPr sz="2800" b="1" dirty="0" err="1">
+                <a:latin typeface="Courier"/>
+                <a:ea typeface="Courier"/>
+                <a:cs typeface="Courier"/>
+                <a:sym typeface="Courier"/>
+              </a:rPr>
+              <a:t>point.py</a:t>
+            </a:r>
+            <a:r>
+              <a:rPr sz="2800" b="1" dirty="0">
+                <a:latin typeface="Courier"/>
+                <a:ea typeface="Courier"/>
+                <a:cs typeface="Courier"/>
+                <a:sym typeface="Courier"/>
+              </a:rPr>
+              <a:t> </a:t>
+            </a:r>
+            <a:r>
+              <a:rPr sz="2800" b="1" dirty="0" err="1">
+                <a:latin typeface="Courier"/>
+                <a:ea typeface="Courier"/>
+                <a:cs typeface="Courier"/>
+                <a:sym typeface="Courier"/>
+              </a:rPr>
+              <a:t>alice</a:t>
+            </a:r>
+            <a:br>
+              <a:rPr sz="2800" dirty="0">
+                <a:latin typeface="Courier"/>
+                <a:ea typeface="Courier"/>
+                <a:cs typeface="Courier"/>
+                <a:sym typeface="Courier"/>
+              </a:rPr>
+            </a:br>
+            <a:r>
+              <a:rPr sz="2800" dirty="0" err="1">
+                <a:latin typeface="Courier"/>
+                <a:ea typeface="Courier"/>
+                <a:cs typeface="Courier"/>
+                <a:sym typeface="Courier"/>
+              </a:rPr>
+              <a:t>alice</a:t>
+            </a:r>
+            <a:r>
+              <a:rPr sz="2800" dirty="0">
+                <a:latin typeface="Courier"/>
+                <a:ea typeface="Courier"/>
+                <a:cs typeface="Courier"/>
+                <a:sym typeface="Courier"/>
+              </a:rPr>
+              <a:t>: 1</a:t>
+            </a:r>
+          </a:p>
+          <a:p>
+            <a:pPr marL="0" lvl="5" indent="0">
+              <a:spcBef>
+                <a:spcPts val="1600"/>
+              </a:spcBef>
+              <a:buSzTx/>
+              <a:buNone/>
+            </a:pPr>
+            <a:r>
+              <a:rPr sz="2800" dirty="0">
+                <a:latin typeface="Courier"/>
+                <a:ea typeface="Courier"/>
+                <a:cs typeface="Courier"/>
+                <a:sym typeface="Courier"/>
+              </a:rPr>
+              <a:t>prompt&gt; </a:t>
+            </a:r>
+            <a:r>
+              <a:rPr sz="2800" b="1" dirty="0">
+                <a:latin typeface="Courier"/>
+                <a:ea typeface="Courier"/>
+                <a:cs typeface="Courier"/>
+                <a:sym typeface="Courier"/>
+              </a:rPr>
+              <a:t>python </a:t>
+            </a:r>
+            <a:r>
+              <a:rPr sz="2800" b="1" dirty="0" err="1">
+                <a:latin typeface="Courier"/>
+                <a:ea typeface="Courier"/>
+                <a:cs typeface="Courier"/>
+                <a:sym typeface="Courier"/>
+              </a:rPr>
+              <a:t>point.py</a:t>
+            </a:r>
+            <a:r>
+              <a:rPr sz="2800" b="1" dirty="0">
+                <a:latin typeface="Courier"/>
+                <a:ea typeface="Courier"/>
+                <a:cs typeface="Courier"/>
+                <a:sym typeface="Courier"/>
+              </a:rPr>
+              <a:t> bob</a:t>
+            </a:r>
+            <a:br>
+              <a:rPr sz="2800" dirty="0">
+                <a:latin typeface="Courier"/>
+                <a:ea typeface="Courier"/>
+                <a:cs typeface="Courier"/>
+                <a:sym typeface="Courier"/>
+              </a:rPr>
+            </a:br>
+            <a:r>
+              <a:rPr sz="2800" dirty="0" err="1">
+                <a:latin typeface="Courier"/>
+                <a:ea typeface="Courier"/>
+                <a:cs typeface="Courier"/>
+                <a:sym typeface="Courier"/>
+              </a:rPr>
+              <a:t>alice</a:t>
+            </a:r>
+            <a:r>
+              <a:rPr sz="2800" dirty="0">
+                <a:latin typeface="Courier"/>
+                <a:ea typeface="Courier"/>
+                <a:cs typeface="Courier"/>
+                <a:sym typeface="Courier"/>
+              </a:rPr>
+              <a:t>: 1</a:t>
+            </a:r>
+            <a:br>
+              <a:rPr sz="2800" dirty="0">
+                <a:latin typeface="Courier"/>
+                <a:ea typeface="Courier"/>
+                <a:cs typeface="Courier"/>
+                <a:sym typeface="Courier"/>
+              </a:rPr>
+            </a:br>
+            <a:r>
+              <a:rPr sz="2800" dirty="0">
+                <a:latin typeface="Courier"/>
+                <a:ea typeface="Courier"/>
+                <a:cs typeface="Courier"/>
+                <a:sym typeface="Courier"/>
+              </a:rPr>
+              <a:t>bob: 1</a:t>
+            </a:r>
+          </a:p>
+          <a:p>
+            <a:pPr marL="0" lvl="5" indent="0">
+              <a:spcBef>
+                <a:spcPts val="1600"/>
+              </a:spcBef>
+              <a:buSzTx/>
+              <a:buNone/>
+            </a:pPr>
+            <a:r>
+              <a:rPr sz="2800" dirty="0">
+                <a:latin typeface="Courier"/>
+                <a:ea typeface="Courier"/>
+                <a:cs typeface="Courier"/>
+                <a:sym typeface="Courier"/>
+              </a:rPr>
+              <a:t>prompt&gt; </a:t>
+            </a:r>
+            <a:r>
+              <a:rPr sz="2800" b="1" dirty="0">
+                <a:latin typeface="Courier"/>
+                <a:ea typeface="Courier"/>
+                <a:cs typeface="Courier"/>
+                <a:sym typeface="Courier"/>
+              </a:rPr>
+              <a:t>python </a:t>
+            </a:r>
+            <a:r>
+              <a:rPr sz="2800" b="1" dirty="0" err="1">
+                <a:latin typeface="Courier"/>
+                <a:ea typeface="Courier"/>
+                <a:cs typeface="Courier"/>
+                <a:sym typeface="Courier"/>
+              </a:rPr>
+              <a:t>point.py</a:t>
+            </a:r>
+            <a:r>
+              <a:rPr sz="2800" b="1" dirty="0">
+                <a:latin typeface="Courier"/>
+                <a:ea typeface="Courier"/>
+                <a:cs typeface="Courier"/>
+                <a:sym typeface="Courier"/>
+              </a:rPr>
+              <a:t> </a:t>
+            </a:r>
+            <a:r>
+              <a:rPr sz="2800" b="1" dirty="0" err="1">
+                <a:latin typeface="Courier"/>
+                <a:ea typeface="Courier"/>
+                <a:cs typeface="Courier"/>
+                <a:sym typeface="Courier"/>
+              </a:rPr>
+              <a:t>alice</a:t>
+            </a:r>
+            <a:br>
+              <a:rPr sz="2800" dirty="0">
+                <a:latin typeface="Courier"/>
+                <a:ea typeface="Courier"/>
+                <a:cs typeface="Courier"/>
+                <a:sym typeface="Courier"/>
+              </a:rPr>
+            </a:br>
+            <a:r>
+              <a:rPr sz="2800" dirty="0" err="1">
+                <a:latin typeface="Courier"/>
+                <a:ea typeface="Courier"/>
+                <a:cs typeface="Courier"/>
+                <a:sym typeface="Courier"/>
+              </a:rPr>
+              <a:t>alice</a:t>
+            </a:r>
+            <a:r>
+              <a:rPr sz="2800" dirty="0">
+                <a:latin typeface="Courier"/>
+                <a:ea typeface="Courier"/>
+                <a:cs typeface="Courier"/>
+                <a:sym typeface="Courier"/>
+              </a:rPr>
+              <a:t>: 2</a:t>
+            </a:r>
+            <a:br>
+              <a:rPr sz="2800" dirty="0">
+                <a:latin typeface="Courier"/>
+                <a:ea typeface="Courier"/>
+                <a:cs typeface="Courier"/>
+                <a:sym typeface="Courier"/>
+              </a:rPr>
+            </a:br>
+            <a:r>
+              <a:rPr sz="2800" dirty="0">
+                <a:latin typeface="Courier"/>
+                <a:ea typeface="Courier"/>
+                <a:cs typeface="Courier"/>
+                <a:sym typeface="Courier"/>
+              </a:rPr>
+              <a:t>bob: 1</a:t>
+            </a:r>
+          </a:p>
+        </p:txBody>
+      </p:sp>
+    </p:spTree>
+    <p:extLst>
+      <p:ext uri="{BB962C8B-B14F-4D97-AF65-F5344CB8AC3E}">
+        <p14:creationId xmlns:p14="http://schemas.microsoft.com/office/powerpoint/2010/main" val="3597173800"/>
+      </p:ext>
+    </p:extLst>
+  </p:cSld>
+  <p:clrMapOvr>
+    <a:masterClrMapping/>
+  </p:clrMapOvr>
+  <p:transition spd="med"/>
+</p:sld>
+</file>
+
+<file path=ppt/slides/slide56.xml><?xml version="1.0" encoding="utf-8"?>
+<p:sld xmlns:a="http://schemas.openxmlformats.org/drawingml/2006/main" xmlns:r="http://schemas.openxmlformats.org/officeDocument/2006/relationships" xmlns:p="http://schemas.openxmlformats.org/presentationml/2006/main">
+  <p:cSld>
+    <p:spTree>
+      <p:nvGrpSpPr>
+        <p:cNvPr id="1" name=""/>
+        <p:cNvGrpSpPr/>
+        <p:nvPr/>
+      </p:nvGrpSpPr>
+      <p:grpSpPr>
+        <a:xfrm>
+          <a:off x="0" y="0"/>
+          <a:ext cx="0" cy="0"/>
+          <a:chOff x="0" y="0"/>
+          <a:chExt cx="0" cy="0"/>
+        </a:xfrm>
+      </p:grpSpPr>
+      <p:sp>
+        <p:nvSpPr>
           <p:cNvPr id="608" name="Demo 2: File Finder"/>
           <p:cNvSpPr txBox="1">
             <a:spLocks noGrp="1"/>
@@ -28955,6 +29268,11 @@
           </a:lstStyle>
           <a:p>
             <a:r>
+              <a:rPr lang="en-US" dirty="0"/>
+              <a:t>Challenge - </a:t>
+            </a:r>
+            <a:r>
+              <a:rPr dirty="0"/>
               <a:t>Demo 2: File Finder</a:t>
             </a:r>
           </a:p>
@@ -29077,6 +29395,172 @@
         </p:txBody>
       </p:sp>
     </p:spTree>
+    <p:extLst>
+      <p:ext uri="{BB962C8B-B14F-4D97-AF65-F5344CB8AC3E}">
+        <p14:creationId xmlns:p14="http://schemas.microsoft.com/office/powerpoint/2010/main" val="1147282556"/>
+      </p:ext>
+    </p:extLst>
+  </p:cSld>
+  <p:clrMapOvr>
+    <a:masterClrMapping/>
+  </p:clrMapOvr>
+  <p:transition spd="med"/>
+</p:sld>
+</file>
+
+<file path=ppt/slides/slide57.xml><?xml version="1.0" encoding="utf-8"?>
+<p:sld xmlns:a="http://schemas.openxmlformats.org/drawingml/2006/main" xmlns:r="http://schemas.openxmlformats.org/officeDocument/2006/relationships" xmlns:p="http://schemas.openxmlformats.org/presentationml/2006/main">
+  <p:cSld>
+    <p:spTree>
+      <p:nvGrpSpPr>
+        <p:cNvPr id="1" name=""/>
+        <p:cNvGrpSpPr/>
+        <p:nvPr/>
+      </p:nvGrpSpPr>
+      <p:grpSpPr>
+        <a:xfrm>
+          <a:off x="0" y="0"/>
+          <a:ext cx="0" cy="0"/>
+          <a:chOff x="0" y="0"/>
+          <a:chExt cx="0" cy="0"/>
+        </a:xfrm>
+      </p:grpSpPr>
+      <p:sp>
+        <p:nvSpPr>
+          <p:cNvPr id="1047" name="Demo 3: sorting files by line length"/>
+          <p:cNvSpPr txBox="1">
+            <a:spLocks noGrp="1"/>
+          </p:cNvSpPr>
+          <p:nvPr>
+            <p:ph type="title"/>
+          </p:nvPr>
+        </p:nvSpPr>
+        <p:spPr>
+          <a:xfrm>
+            <a:off x="952500" y="254000"/>
+            <a:ext cx="11099800" cy="902345"/>
+          </a:xfrm>
+          <a:prstGeom prst="rect">
+            <a:avLst/>
+          </a:prstGeom>
+        </p:spPr>
+        <p:txBody>
+          <a:bodyPr>
+            <a:normAutofit fontScale="90000"/>
+          </a:bodyPr>
+          <a:lstStyle>
+            <a:lvl1pPr algn="l">
+              <a:defRPr sz="4800"/>
+            </a:lvl1pPr>
+          </a:lstStyle>
+          <a:p>
+            <a:r>
+              <a:rPr lang="en-US" dirty="0"/>
+              <a:t>Challenge - Demo</a:t>
+            </a:r>
+            <a:r>
+              <a:rPr dirty="0"/>
+              <a:t> 3: sorting files by line length</a:t>
+            </a:r>
+          </a:p>
+        </p:txBody>
+      </p:sp>
+      <p:sp>
+        <p:nvSpPr>
+          <p:cNvPr id="1048" name="Goal: output file contents, with shortest line first…"/>
+          <p:cNvSpPr txBox="1">
+            <a:spLocks noGrp="1"/>
+          </p:cNvSpPr>
+          <p:nvPr>
+            <p:ph type="body" idx="1"/>
+          </p:nvPr>
+        </p:nvSpPr>
+        <p:spPr>
+          <a:xfrm>
+            <a:off x="952500" y="1587896"/>
+            <a:ext cx="11540877" cy="7684494"/>
+          </a:xfrm>
+          <a:prstGeom prst="rect">
+            <a:avLst/>
+          </a:prstGeom>
+        </p:spPr>
+        <p:txBody>
+          <a:bodyPr anchor="t"/>
+          <a:lstStyle/>
+          <a:p>
+            <a:pPr marL="0" lvl="5" indent="0">
+              <a:buSzTx/>
+              <a:buNone/>
+              <a:defRPr>
+                <a:solidFill>
+                  <a:schemeClr val="accent5">
+                    <a:hueOff val="-82419"/>
+                    <a:satOff val="-9513"/>
+                    <a:lumOff val="-16343"/>
+                  </a:schemeClr>
+                </a:solidFill>
+              </a:defRPr>
+            </a:pPr>
+            <a:r>
+              <a:t>Goal: output file contents, with shortest line first</a:t>
+            </a:r>
+          </a:p>
+          <a:p>
+            <a:pPr marL="0" lvl="5" indent="0">
+              <a:buSzTx/>
+              <a:buNone/>
+            </a:pPr>
+            <a:r>
+              <a:rPr b="1"/>
+              <a:t>Input</a:t>
+            </a:r>
+            <a:r>
+              <a:t>:</a:t>
+            </a:r>
+          </a:p>
+          <a:p>
+            <a:pPr marL="635000" indent="-444500">
+              <a:spcBef>
+                <a:spcPts val="0"/>
+              </a:spcBef>
+              <a:defRPr sz="2800"/>
+            </a:pPr>
+            <a:r>
+              <a:t>a text file</a:t>
+            </a:r>
+          </a:p>
+          <a:p>
+            <a:pPr marL="0" lvl="5" indent="0">
+              <a:buSzTx/>
+              <a:buNone/>
+            </a:pPr>
+            <a:r>
+              <a:rPr b="1"/>
+              <a:t>Output</a:t>
+            </a:r>
+            <a:r>
+              <a:t>:</a:t>
+            </a:r>
+          </a:p>
+          <a:p>
+            <a:pPr marL="635000" indent="-444500">
+              <a:spcBef>
+                <a:spcPts val="0"/>
+              </a:spcBef>
+              <a:defRPr sz="2800"/>
+            </a:pPr>
+            <a:r>
+              <a:t>print lines sorted</a:t>
+            </a:r>
+          </a:p>
+        </p:txBody>
+      </p:sp>
+    </p:spTree>
+    <p:extLst>
+      <p:ext uri="{BB962C8B-B14F-4D97-AF65-F5344CB8AC3E}">
+        <p14:creationId xmlns:p14="http://schemas.microsoft.com/office/powerpoint/2010/main" val="13070085"/>
+      </p:ext>
+    </p:extLst>
   </p:cSld>
   <p:clrMapOvr>
     <a:masterClrMapping/>
@@ -29226,7 +29710,7 @@
           </a:ln>
           <a:extLst>
             <a:ext uri="{C572A759-6A51-4108-AA02-DFA0A04FC94B}">
-              <ma14:wrappingTextBoxFlag xmlns:ma14="http://schemas.microsoft.com/office/mac/drawingml/2011/main" xmlns:a14="http://schemas.microsoft.com/office/drawing/2010/main" xmlns:m="http://schemas.openxmlformats.org/officeDocument/2006/math" xmlns="" val="1"/>
+              <ma14:wrappingTextBoxFlag xmlns="" xmlns:m="http://schemas.openxmlformats.org/officeDocument/2006/math" xmlns:a14="http://schemas.microsoft.com/office/drawing/2010/main" xmlns:ma14="http://schemas.microsoft.com/office/mac/drawingml/2011/main" val="1"/>
             </a:ext>
           </a:extLst>
         </p:spPr>
@@ -29402,7 +29886,7 @@
           </a:ln>
           <a:extLst>
             <a:ext uri="{C572A759-6A51-4108-AA02-DFA0A04FC94B}">
-              <ma14:wrappingTextBoxFlag xmlns:ma14="http://schemas.microsoft.com/office/mac/drawingml/2011/main" xmlns:a14="http://schemas.microsoft.com/office/drawing/2010/main" xmlns:m="http://schemas.openxmlformats.org/officeDocument/2006/math" xmlns="" val="1"/>
+              <ma14:wrappingTextBoxFlag xmlns="" xmlns:m="http://schemas.openxmlformats.org/officeDocument/2006/math" xmlns:a14="http://schemas.microsoft.com/office/drawing/2010/main" xmlns:ma14="http://schemas.microsoft.com/office/mac/drawingml/2011/main" val="1"/>
             </a:ext>
           </a:extLst>
         </p:spPr>
@@ -29578,7 +30062,7 @@
           </a:ln>
           <a:extLst>
             <a:ext uri="{C572A759-6A51-4108-AA02-DFA0A04FC94B}">
-              <ma14:wrappingTextBoxFlag xmlns:ma14="http://schemas.microsoft.com/office/mac/drawingml/2011/main" xmlns:a14="http://schemas.microsoft.com/office/drawing/2010/main" xmlns:m="http://schemas.openxmlformats.org/officeDocument/2006/math" xmlns="" val="1"/>
+              <ma14:wrappingTextBoxFlag xmlns="" xmlns:m="http://schemas.openxmlformats.org/officeDocument/2006/math" xmlns:a14="http://schemas.microsoft.com/office/drawing/2010/main" xmlns:ma14="http://schemas.microsoft.com/office/mac/drawingml/2011/main" val="1"/>
             </a:ext>
           </a:extLst>
         </p:spPr>
@@ -29625,7 +30109,7 @@
           </a:ln>
           <a:extLst>
             <a:ext uri="{C572A759-6A51-4108-AA02-DFA0A04FC94B}">
-              <ma14:wrappingTextBoxFlag xmlns:ma14="http://schemas.microsoft.com/office/mac/drawingml/2011/main" xmlns:a14="http://schemas.microsoft.com/office/drawing/2010/main" xmlns:m="http://schemas.openxmlformats.org/officeDocument/2006/math" xmlns="" val="1"/>
+              <ma14:wrappingTextBoxFlag xmlns="" xmlns:m="http://schemas.openxmlformats.org/officeDocument/2006/math" xmlns:a14="http://schemas.microsoft.com/office/drawing/2010/main" xmlns:ma14="http://schemas.microsoft.com/office/mac/drawingml/2011/main" val="1"/>
             </a:ext>
           </a:extLst>
         </p:spPr>
@@ -29672,7 +30156,7 @@
           </a:ln>
           <a:extLst>
             <a:ext uri="{C572A759-6A51-4108-AA02-DFA0A04FC94B}">
-              <ma14:wrappingTextBoxFlag xmlns:ma14="http://schemas.microsoft.com/office/mac/drawingml/2011/main" xmlns:a14="http://schemas.microsoft.com/office/drawing/2010/main" xmlns:m="http://schemas.openxmlformats.org/officeDocument/2006/math" xmlns="" val="1"/>
+              <ma14:wrappingTextBoxFlag xmlns="" xmlns:m="http://schemas.openxmlformats.org/officeDocument/2006/math" xmlns:a14="http://schemas.microsoft.com/office/drawing/2010/main" xmlns:ma14="http://schemas.microsoft.com/office/mac/drawingml/2011/main" val="1"/>
             </a:ext>
           </a:extLst>
         </p:spPr>
@@ -29850,7 +30334,7 @@
           </a:ln>
           <a:extLst>
             <a:ext uri="{C572A759-6A51-4108-AA02-DFA0A04FC94B}">
-              <ma14:wrappingTextBoxFlag xmlns:ma14="http://schemas.microsoft.com/office/mac/drawingml/2011/main" xmlns:a14="http://schemas.microsoft.com/office/drawing/2010/main" xmlns:m="http://schemas.openxmlformats.org/officeDocument/2006/math" xmlns="" val="1"/>
+              <ma14:wrappingTextBoxFlag xmlns="" xmlns:m="http://schemas.openxmlformats.org/officeDocument/2006/math" xmlns:a14="http://schemas.microsoft.com/office/drawing/2010/main" xmlns:ma14="http://schemas.microsoft.com/office/mac/drawingml/2011/main" val="1"/>
             </a:ext>
           </a:extLst>
         </p:spPr>
@@ -30041,7 +30525,7 @@
           </a:ln>
           <a:extLst>
             <a:ext uri="{C572A759-6A51-4108-AA02-DFA0A04FC94B}">
-              <ma14:wrappingTextBoxFlag xmlns:ma14="http://schemas.microsoft.com/office/mac/drawingml/2011/main" xmlns:a14="http://schemas.microsoft.com/office/drawing/2010/main" xmlns:m="http://schemas.openxmlformats.org/officeDocument/2006/math" xmlns="" val="1"/>
+              <ma14:wrappingTextBoxFlag xmlns="" xmlns:m="http://schemas.openxmlformats.org/officeDocument/2006/math" xmlns:a14="http://schemas.microsoft.com/office/drawing/2010/main" xmlns:ma14="http://schemas.microsoft.com/office/mac/drawingml/2011/main" val="1"/>
             </a:ext>
           </a:extLst>
         </p:spPr>
@@ -30217,7 +30701,7 @@
           </a:ln>
           <a:extLst>
             <a:ext uri="{C572A759-6A51-4108-AA02-DFA0A04FC94B}">
-              <ma14:wrappingTextBoxFlag xmlns:ma14="http://schemas.microsoft.com/office/mac/drawingml/2011/main" xmlns:a14="http://schemas.microsoft.com/office/drawing/2010/main" xmlns:m="http://schemas.openxmlformats.org/officeDocument/2006/math" xmlns="" val="1"/>
+              <ma14:wrappingTextBoxFlag xmlns="" xmlns:m="http://schemas.openxmlformats.org/officeDocument/2006/math" xmlns:a14="http://schemas.microsoft.com/office/drawing/2010/main" xmlns:ma14="http://schemas.microsoft.com/office/mac/drawingml/2011/main" val="1"/>
             </a:ext>
           </a:extLst>
         </p:spPr>
@@ -30264,7 +30748,7 @@
           </a:ln>
           <a:extLst>
             <a:ext uri="{C572A759-6A51-4108-AA02-DFA0A04FC94B}">
-              <ma14:wrappingTextBoxFlag xmlns:ma14="http://schemas.microsoft.com/office/mac/drawingml/2011/main" xmlns:a14="http://schemas.microsoft.com/office/drawing/2010/main" xmlns:m="http://schemas.openxmlformats.org/officeDocument/2006/math" xmlns="" val="1"/>
+              <ma14:wrappingTextBoxFlag xmlns="" xmlns:m="http://schemas.openxmlformats.org/officeDocument/2006/math" xmlns:a14="http://schemas.microsoft.com/office/drawing/2010/main" xmlns:ma14="http://schemas.microsoft.com/office/mac/drawingml/2011/main" val="1"/>
             </a:ext>
           </a:extLst>
         </p:spPr>
@@ -30311,7 +30795,7 @@
           </a:ln>
           <a:extLst>
             <a:ext uri="{C572A759-6A51-4108-AA02-DFA0A04FC94B}">
-              <ma14:wrappingTextBoxFlag xmlns:ma14="http://schemas.microsoft.com/office/mac/drawingml/2011/main" xmlns:a14="http://schemas.microsoft.com/office/drawing/2010/main" xmlns:m="http://schemas.openxmlformats.org/officeDocument/2006/math" xmlns="" val="1"/>
+              <ma14:wrappingTextBoxFlag xmlns="" xmlns:m="http://schemas.openxmlformats.org/officeDocument/2006/math" xmlns:a14="http://schemas.microsoft.com/office/drawing/2010/main" xmlns:ma14="http://schemas.microsoft.com/office/mac/drawingml/2011/main" val="1"/>
             </a:ext>
           </a:extLst>
         </p:spPr>
@@ -30444,7 +30928,7 @@
           </a:ln>
           <a:extLst>
             <a:ext uri="{C572A759-6A51-4108-AA02-DFA0A04FC94B}">
-              <ma14:wrappingTextBoxFlag xmlns:ma14="http://schemas.microsoft.com/office/mac/drawingml/2011/main" xmlns:a14="http://schemas.microsoft.com/office/drawing/2010/main" xmlns:m="http://schemas.openxmlformats.org/officeDocument/2006/math" xmlns="" val="1"/>
+              <ma14:wrappingTextBoxFlag xmlns="" xmlns:m="http://schemas.openxmlformats.org/officeDocument/2006/math" xmlns:a14="http://schemas.microsoft.com/office/drawing/2010/main" xmlns:ma14="http://schemas.microsoft.com/office/mac/drawingml/2011/main" val="1"/>
             </a:ext>
           </a:extLst>
         </p:spPr>
@@ -30639,7 +31123,7 @@
           </a:ln>
           <a:extLst>
             <a:ext uri="{C572A759-6A51-4108-AA02-DFA0A04FC94B}">
-              <ma14:wrappingTextBoxFlag xmlns:ma14="http://schemas.microsoft.com/office/mac/drawingml/2011/main" xmlns:a14="http://schemas.microsoft.com/office/drawing/2010/main" xmlns:m="http://schemas.openxmlformats.org/officeDocument/2006/math" xmlns="" val="1"/>
+              <ma14:wrappingTextBoxFlag xmlns="" xmlns:m="http://schemas.openxmlformats.org/officeDocument/2006/math" xmlns:a14="http://schemas.microsoft.com/office/drawing/2010/main" xmlns:ma14="http://schemas.microsoft.com/office/mac/drawingml/2011/main" val="1"/>
             </a:ext>
           </a:extLst>
         </p:spPr>
@@ -30815,7 +31299,7 @@
           </a:ln>
           <a:extLst>
             <a:ext uri="{C572A759-6A51-4108-AA02-DFA0A04FC94B}">
-              <ma14:wrappingTextBoxFlag xmlns:ma14="http://schemas.microsoft.com/office/mac/drawingml/2011/main" xmlns:a14="http://schemas.microsoft.com/office/drawing/2010/main" xmlns:m="http://schemas.openxmlformats.org/officeDocument/2006/math" xmlns="" val="1"/>
+              <ma14:wrappingTextBoxFlag xmlns="" xmlns:m="http://schemas.openxmlformats.org/officeDocument/2006/math" xmlns:a14="http://schemas.microsoft.com/office/drawing/2010/main" xmlns:ma14="http://schemas.microsoft.com/office/mac/drawingml/2011/main" val="1"/>
             </a:ext>
           </a:extLst>
         </p:spPr>
@@ -30862,7 +31346,7 @@
           </a:ln>
           <a:extLst>
             <a:ext uri="{C572A759-6A51-4108-AA02-DFA0A04FC94B}">
-              <ma14:wrappingTextBoxFlag xmlns:ma14="http://schemas.microsoft.com/office/mac/drawingml/2011/main" xmlns:a14="http://schemas.microsoft.com/office/drawing/2010/main" xmlns:m="http://schemas.openxmlformats.org/officeDocument/2006/math" xmlns="" val="1"/>
+              <ma14:wrappingTextBoxFlag xmlns="" xmlns:m="http://schemas.openxmlformats.org/officeDocument/2006/math" xmlns:a14="http://schemas.microsoft.com/office/drawing/2010/main" xmlns:ma14="http://schemas.microsoft.com/office/mac/drawingml/2011/main" val="1"/>
             </a:ext>
           </a:extLst>
         </p:spPr>
@@ -30953,7 +31437,7 @@
           </a:ln>
           <a:extLst>
             <a:ext uri="{C572A759-6A51-4108-AA02-DFA0A04FC94B}">
-              <ma14:wrappingTextBoxFlag xmlns:ma14="http://schemas.microsoft.com/office/mac/drawingml/2011/main" xmlns:a14="http://schemas.microsoft.com/office/drawing/2010/main" xmlns:m="http://schemas.openxmlformats.org/officeDocument/2006/math" xmlns="" val="1"/>
+              <ma14:wrappingTextBoxFlag xmlns="" xmlns:m="http://schemas.openxmlformats.org/officeDocument/2006/math" xmlns:a14="http://schemas.microsoft.com/office/drawing/2010/main" xmlns:ma14="http://schemas.microsoft.com/office/mac/drawingml/2011/main" val="1"/>
             </a:ext>
           </a:extLst>
         </p:spPr>
@@ -31192,7 +31676,7 @@
           </a:ln>
           <a:extLst>
             <a:ext uri="{C572A759-6A51-4108-AA02-DFA0A04FC94B}">
-              <ma14:wrappingTextBoxFlag xmlns:ma14="http://schemas.microsoft.com/office/mac/drawingml/2011/main" xmlns:a14="http://schemas.microsoft.com/office/drawing/2010/main" xmlns:m="http://schemas.openxmlformats.org/officeDocument/2006/math" xmlns="" val="1"/>
+              <ma14:wrappingTextBoxFlag xmlns="" xmlns:m="http://schemas.openxmlformats.org/officeDocument/2006/math" xmlns:a14="http://schemas.microsoft.com/office/drawing/2010/main" xmlns:ma14="http://schemas.microsoft.com/office/mac/drawingml/2011/main" val="1"/>
             </a:ext>
           </a:extLst>
         </p:spPr>
@@ -31267,7 +31751,7 @@
           </a:ln>
           <a:extLst>
             <a:ext uri="{C572A759-6A51-4108-AA02-DFA0A04FC94B}">
-              <ma14:wrappingTextBoxFlag xmlns:ma14="http://schemas.microsoft.com/office/mac/drawingml/2011/main" xmlns:a14="http://schemas.microsoft.com/office/drawing/2010/main" xmlns:m="http://schemas.openxmlformats.org/officeDocument/2006/math" xmlns="" val="1"/>
+              <ma14:wrappingTextBoxFlag xmlns="" xmlns:m="http://schemas.openxmlformats.org/officeDocument/2006/math" xmlns:a14="http://schemas.microsoft.com/office/drawing/2010/main" xmlns:ma14="http://schemas.microsoft.com/office/mac/drawingml/2011/main" val="1"/>
             </a:ext>
           </a:extLst>
         </p:spPr>
@@ -31377,7 +31861,7 @@
           </a:ln>
           <a:extLst>
             <a:ext uri="{C572A759-6A51-4108-AA02-DFA0A04FC94B}">
-              <ma14:wrappingTextBoxFlag xmlns:ma14="http://schemas.microsoft.com/office/mac/drawingml/2011/main" xmlns:a14="http://schemas.microsoft.com/office/drawing/2010/main" xmlns:m="http://schemas.openxmlformats.org/officeDocument/2006/math" xmlns="" val="1"/>
+              <ma14:wrappingTextBoxFlag xmlns="" xmlns:m="http://schemas.openxmlformats.org/officeDocument/2006/math" xmlns:a14="http://schemas.microsoft.com/office/drawing/2010/main" xmlns:ma14="http://schemas.microsoft.com/office/mac/drawingml/2011/main" val="1"/>
             </a:ext>
           </a:extLst>
         </p:spPr>
@@ -31553,7 +32037,7 @@
           </a:ln>
           <a:extLst>
             <a:ext uri="{C572A759-6A51-4108-AA02-DFA0A04FC94B}">
-              <ma14:wrappingTextBoxFlag xmlns:ma14="http://schemas.microsoft.com/office/mac/drawingml/2011/main" xmlns:a14="http://schemas.microsoft.com/office/drawing/2010/main" xmlns:m="http://schemas.openxmlformats.org/officeDocument/2006/math" xmlns="" val="1"/>
+              <ma14:wrappingTextBoxFlag xmlns="" xmlns:m="http://schemas.openxmlformats.org/officeDocument/2006/math" xmlns:a14="http://schemas.microsoft.com/office/drawing/2010/main" xmlns:ma14="http://schemas.microsoft.com/office/mac/drawingml/2011/main" val="1"/>
             </a:ext>
           </a:extLst>
         </p:spPr>
@@ -31600,7 +32084,7 @@
           </a:ln>
           <a:extLst>
             <a:ext uri="{C572A759-6A51-4108-AA02-DFA0A04FC94B}">
-              <ma14:wrappingTextBoxFlag xmlns:ma14="http://schemas.microsoft.com/office/mac/drawingml/2011/main" xmlns:a14="http://schemas.microsoft.com/office/drawing/2010/main" xmlns:m="http://schemas.openxmlformats.org/officeDocument/2006/math" xmlns="" val="1"/>
+              <ma14:wrappingTextBoxFlag xmlns="" xmlns:m="http://schemas.openxmlformats.org/officeDocument/2006/math" xmlns:a14="http://schemas.microsoft.com/office/drawing/2010/main" xmlns:ma14="http://schemas.microsoft.com/office/mac/drawingml/2011/main" val="1"/>
             </a:ext>
           </a:extLst>
         </p:spPr>
@@ -31691,7 +32175,7 @@
           </a:ln>
           <a:extLst>
             <a:ext uri="{C572A759-6A51-4108-AA02-DFA0A04FC94B}">
-              <ma14:wrappingTextBoxFlag xmlns:ma14="http://schemas.microsoft.com/office/mac/drawingml/2011/main" xmlns:a14="http://schemas.microsoft.com/office/drawing/2010/main" xmlns:m="http://schemas.openxmlformats.org/officeDocument/2006/math" xmlns="" val="1"/>
+              <ma14:wrappingTextBoxFlag xmlns="" xmlns:m="http://schemas.openxmlformats.org/officeDocument/2006/math" xmlns:a14="http://schemas.microsoft.com/office/drawing/2010/main" xmlns:ma14="http://schemas.microsoft.com/office/mac/drawingml/2011/main" val="1"/>
             </a:ext>
           </a:extLst>
         </p:spPr>

</xml_diff>